<commit_message>
Class 2 slide updated
</commit_message>
<xml_diff>
--- a/Class-02/Class-02.pptx
+++ b/Class-02/Class-02.pptx
@@ -5,10 +5,10 @@
     <p:sldMasterId id="2147483672" r:id="rId4"/>
   </p:sldMasterIdLst>
   <p:notesMasterIdLst>
-    <p:notesMasterId r:id="rId22"/>
+    <p:notesMasterId r:id="rId26"/>
   </p:notesMasterIdLst>
   <p:handoutMasterIdLst>
-    <p:handoutMasterId r:id="rId23"/>
+    <p:handoutMasterId r:id="rId27"/>
   </p:handoutMasterIdLst>
   <p:sldIdLst>
     <p:sldId id="256" r:id="rId5"/>
@@ -28,6 +28,10 @@
     <p:sldId id="274" r:id="rId19"/>
     <p:sldId id="275" r:id="rId20"/>
     <p:sldId id="271" r:id="rId21"/>
+    <p:sldId id="276" r:id="rId22"/>
+    <p:sldId id="277" r:id="rId23"/>
+    <p:sldId id="278" r:id="rId24"/>
+    <p:sldId id="279" r:id="rId25"/>
   </p:sldIdLst>
   <p:sldSz cx="12192000" cy="6858000"/>
   <p:notesSz cx="6858000" cy="9144000"/>
@@ -4806,6 +4810,174 @@
 </p:notes>
 </file>
 
+<file path=ppt/notesSlides/notesSlide18.xml><?xml version="1.0" encoding="utf-8"?>
+<p:notes xmlns:a="http://schemas.openxmlformats.org/drawingml/2006/main" xmlns:r="http://schemas.openxmlformats.org/officeDocument/2006/relationships" xmlns:p="http://schemas.openxmlformats.org/presentationml/2006/main">
+  <p:cSld>
+    <p:spTree>
+      <p:nvGrpSpPr>
+        <p:cNvPr id="1" name=""/>
+        <p:cNvGrpSpPr/>
+        <p:nvPr/>
+      </p:nvGrpSpPr>
+      <p:grpSpPr>
+        <a:xfrm>
+          <a:off x="0" y="0"/>
+          <a:ext cx="0" cy="0"/>
+          <a:chOff x="0" y="0"/>
+          <a:chExt cx="0" cy="0"/>
+        </a:xfrm>
+      </p:grpSpPr>
+      <p:sp>
+        <p:nvSpPr>
+          <p:cNvPr id="2" name="Slide Image Placeholder 1"/>
+          <p:cNvSpPr>
+            <a:spLocks noGrp="1" noRot="1" noChangeAspect="1"/>
+          </p:cNvSpPr>
+          <p:nvPr>
+            <p:ph type="sldImg"/>
+          </p:nvPr>
+        </p:nvSpPr>
+        <p:spPr/>
+      </p:sp>
+      <p:sp>
+        <p:nvSpPr>
+          <p:cNvPr id="3" name="Notes Placeholder 2"/>
+          <p:cNvSpPr>
+            <a:spLocks noGrp="1"/>
+          </p:cNvSpPr>
+          <p:nvPr>
+            <p:ph type="body" idx="1"/>
+          </p:nvPr>
+        </p:nvSpPr>
+        <p:spPr/>
+        <p:txBody>
+          <a:bodyPr/>
+          <a:lstStyle/>
+          <a:p>
+            <a:endParaRPr lang="en-US" dirty="0"/>
+          </a:p>
+        </p:txBody>
+      </p:sp>
+      <p:sp>
+        <p:nvSpPr>
+          <p:cNvPr id="4" name="Slide Number Placeholder 3"/>
+          <p:cNvSpPr>
+            <a:spLocks noGrp="1"/>
+          </p:cNvSpPr>
+          <p:nvPr>
+            <p:ph type="sldNum" sz="quarter" idx="5"/>
+          </p:nvPr>
+        </p:nvSpPr>
+        <p:spPr/>
+        <p:txBody>
+          <a:bodyPr/>
+          <a:lstStyle/>
+          <a:p>
+            <a:fld id="{CD3F15BC-4AA1-41C4-8C26-91A7E3BB93DC}" type="slidenum">
+              <a:rPr lang="en-US" smtClean="0"/>
+              <a:t>18</a:t>
+            </a:fld>
+            <a:endParaRPr lang="en-US" dirty="0"/>
+          </a:p>
+        </p:txBody>
+      </p:sp>
+    </p:spTree>
+    <p:extLst>
+      <p:ext uri="{BB962C8B-B14F-4D97-AF65-F5344CB8AC3E}">
+        <p14:creationId xmlns:p14="http://schemas.microsoft.com/office/powerpoint/2010/main" val="4018957382"/>
+      </p:ext>
+    </p:extLst>
+  </p:cSld>
+  <p:clrMapOvr>
+    <a:masterClrMapping/>
+  </p:clrMapOvr>
+</p:notes>
+</file>
+
+<file path=ppt/notesSlides/notesSlide19.xml><?xml version="1.0" encoding="utf-8"?>
+<p:notes xmlns:a="http://schemas.openxmlformats.org/drawingml/2006/main" xmlns:r="http://schemas.openxmlformats.org/officeDocument/2006/relationships" xmlns:p="http://schemas.openxmlformats.org/presentationml/2006/main">
+  <p:cSld>
+    <p:spTree>
+      <p:nvGrpSpPr>
+        <p:cNvPr id="1" name=""/>
+        <p:cNvGrpSpPr/>
+        <p:nvPr/>
+      </p:nvGrpSpPr>
+      <p:grpSpPr>
+        <a:xfrm>
+          <a:off x="0" y="0"/>
+          <a:ext cx="0" cy="0"/>
+          <a:chOff x="0" y="0"/>
+          <a:chExt cx="0" cy="0"/>
+        </a:xfrm>
+      </p:grpSpPr>
+      <p:sp>
+        <p:nvSpPr>
+          <p:cNvPr id="2" name="Slide Image Placeholder 1"/>
+          <p:cNvSpPr>
+            <a:spLocks noGrp="1" noRot="1" noChangeAspect="1"/>
+          </p:cNvSpPr>
+          <p:nvPr>
+            <p:ph type="sldImg"/>
+          </p:nvPr>
+        </p:nvSpPr>
+        <p:spPr/>
+      </p:sp>
+      <p:sp>
+        <p:nvSpPr>
+          <p:cNvPr id="3" name="Notes Placeholder 2"/>
+          <p:cNvSpPr>
+            <a:spLocks noGrp="1"/>
+          </p:cNvSpPr>
+          <p:nvPr>
+            <p:ph type="body" idx="1"/>
+          </p:nvPr>
+        </p:nvSpPr>
+        <p:spPr/>
+        <p:txBody>
+          <a:bodyPr/>
+          <a:lstStyle/>
+          <a:p>
+            <a:endParaRPr lang="en-US" dirty="0"/>
+          </a:p>
+        </p:txBody>
+      </p:sp>
+      <p:sp>
+        <p:nvSpPr>
+          <p:cNvPr id="4" name="Slide Number Placeholder 3"/>
+          <p:cNvSpPr>
+            <a:spLocks noGrp="1"/>
+          </p:cNvSpPr>
+          <p:nvPr>
+            <p:ph type="sldNum" sz="quarter" idx="5"/>
+          </p:nvPr>
+        </p:nvSpPr>
+        <p:spPr/>
+        <p:txBody>
+          <a:bodyPr/>
+          <a:lstStyle/>
+          <a:p>
+            <a:fld id="{CD3F15BC-4AA1-41C4-8C26-91A7E3BB93DC}" type="slidenum">
+              <a:rPr lang="en-US" smtClean="0"/>
+              <a:t>19</a:t>
+            </a:fld>
+            <a:endParaRPr lang="en-US" dirty="0"/>
+          </a:p>
+        </p:txBody>
+      </p:sp>
+    </p:spTree>
+    <p:extLst>
+      <p:ext uri="{BB962C8B-B14F-4D97-AF65-F5344CB8AC3E}">
+        <p14:creationId xmlns:p14="http://schemas.microsoft.com/office/powerpoint/2010/main" val="4190480686"/>
+      </p:ext>
+    </p:extLst>
+  </p:cSld>
+  <p:clrMapOvr>
+    <a:masterClrMapping/>
+  </p:clrMapOvr>
+</p:notes>
+</file>
+
 <file path=ppt/notesSlides/notesSlide2.xml><?xml version="1.0" encoding="utf-8"?>
 <p:notes xmlns:a="http://schemas.openxmlformats.org/drawingml/2006/main" xmlns:r="http://schemas.openxmlformats.org/officeDocument/2006/relationships" xmlns:p="http://schemas.openxmlformats.org/presentationml/2006/main">
   <p:cSld>
@@ -4881,6 +5053,174 @@
     <p:extLst>
       <p:ext uri="{BB962C8B-B14F-4D97-AF65-F5344CB8AC3E}">
         <p14:creationId xmlns:p14="http://schemas.microsoft.com/office/powerpoint/2010/main" val="3573156617"/>
+      </p:ext>
+    </p:extLst>
+  </p:cSld>
+  <p:clrMapOvr>
+    <a:masterClrMapping/>
+  </p:clrMapOvr>
+</p:notes>
+</file>
+
+<file path=ppt/notesSlides/notesSlide20.xml><?xml version="1.0" encoding="utf-8"?>
+<p:notes xmlns:a="http://schemas.openxmlformats.org/drawingml/2006/main" xmlns:r="http://schemas.openxmlformats.org/officeDocument/2006/relationships" xmlns:p="http://schemas.openxmlformats.org/presentationml/2006/main">
+  <p:cSld>
+    <p:spTree>
+      <p:nvGrpSpPr>
+        <p:cNvPr id="1" name=""/>
+        <p:cNvGrpSpPr/>
+        <p:nvPr/>
+      </p:nvGrpSpPr>
+      <p:grpSpPr>
+        <a:xfrm>
+          <a:off x="0" y="0"/>
+          <a:ext cx="0" cy="0"/>
+          <a:chOff x="0" y="0"/>
+          <a:chExt cx="0" cy="0"/>
+        </a:xfrm>
+      </p:grpSpPr>
+      <p:sp>
+        <p:nvSpPr>
+          <p:cNvPr id="2" name="Slide Image Placeholder 1"/>
+          <p:cNvSpPr>
+            <a:spLocks noGrp="1" noRot="1" noChangeAspect="1"/>
+          </p:cNvSpPr>
+          <p:nvPr>
+            <p:ph type="sldImg"/>
+          </p:nvPr>
+        </p:nvSpPr>
+        <p:spPr/>
+      </p:sp>
+      <p:sp>
+        <p:nvSpPr>
+          <p:cNvPr id="3" name="Notes Placeholder 2"/>
+          <p:cNvSpPr>
+            <a:spLocks noGrp="1"/>
+          </p:cNvSpPr>
+          <p:nvPr>
+            <p:ph type="body" idx="1"/>
+          </p:nvPr>
+        </p:nvSpPr>
+        <p:spPr/>
+        <p:txBody>
+          <a:bodyPr/>
+          <a:lstStyle/>
+          <a:p>
+            <a:endParaRPr lang="en-US" dirty="0"/>
+          </a:p>
+        </p:txBody>
+      </p:sp>
+      <p:sp>
+        <p:nvSpPr>
+          <p:cNvPr id="4" name="Slide Number Placeholder 3"/>
+          <p:cNvSpPr>
+            <a:spLocks noGrp="1"/>
+          </p:cNvSpPr>
+          <p:nvPr>
+            <p:ph type="sldNum" sz="quarter" idx="5"/>
+          </p:nvPr>
+        </p:nvSpPr>
+        <p:spPr/>
+        <p:txBody>
+          <a:bodyPr/>
+          <a:lstStyle/>
+          <a:p>
+            <a:fld id="{CD3F15BC-4AA1-41C4-8C26-91A7E3BB93DC}" type="slidenum">
+              <a:rPr lang="en-US" smtClean="0"/>
+              <a:t>20</a:t>
+            </a:fld>
+            <a:endParaRPr lang="en-US" dirty="0"/>
+          </a:p>
+        </p:txBody>
+      </p:sp>
+    </p:spTree>
+    <p:extLst>
+      <p:ext uri="{BB962C8B-B14F-4D97-AF65-F5344CB8AC3E}">
+        <p14:creationId xmlns:p14="http://schemas.microsoft.com/office/powerpoint/2010/main" val="1815790167"/>
+      </p:ext>
+    </p:extLst>
+  </p:cSld>
+  <p:clrMapOvr>
+    <a:masterClrMapping/>
+  </p:clrMapOvr>
+</p:notes>
+</file>
+
+<file path=ppt/notesSlides/notesSlide21.xml><?xml version="1.0" encoding="utf-8"?>
+<p:notes xmlns:a="http://schemas.openxmlformats.org/drawingml/2006/main" xmlns:r="http://schemas.openxmlformats.org/officeDocument/2006/relationships" xmlns:p="http://schemas.openxmlformats.org/presentationml/2006/main">
+  <p:cSld>
+    <p:spTree>
+      <p:nvGrpSpPr>
+        <p:cNvPr id="1" name=""/>
+        <p:cNvGrpSpPr/>
+        <p:nvPr/>
+      </p:nvGrpSpPr>
+      <p:grpSpPr>
+        <a:xfrm>
+          <a:off x="0" y="0"/>
+          <a:ext cx="0" cy="0"/>
+          <a:chOff x="0" y="0"/>
+          <a:chExt cx="0" cy="0"/>
+        </a:xfrm>
+      </p:grpSpPr>
+      <p:sp>
+        <p:nvSpPr>
+          <p:cNvPr id="2" name="Slide Image Placeholder 1"/>
+          <p:cNvSpPr>
+            <a:spLocks noGrp="1" noRot="1" noChangeAspect="1"/>
+          </p:cNvSpPr>
+          <p:nvPr>
+            <p:ph type="sldImg"/>
+          </p:nvPr>
+        </p:nvSpPr>
+        <p:spPr/>
+      </p:sp>
+      <p:sp>
+        <p:nvSpPr>
+          <p:cNvPr id="3" name="Notes Placeholder 2"/>
+          <p:cNvSpPr>
+            <a:spLocks noGrp="1"/>
+          </p:cNvSpPr>
+          <p:nvPr>
+            <p:ph type="body" idx="1"/>
+          </p:nvPr>
+        </p:nvSpPr>
+        <p:spPr/>
+        <p:txBody>
+          <a:bodyPr/>
+          <a:lstStyle/>
+          <a:p>
+            <a:endParaRPr lang="en-US" dirty="0"/>
+          </a:p>
+        </p:txBody>
+      </p:sp>
+      <p:sp>
+        <p:nvSpPr>
+          <p:cNvPr id="4" name="Slide Number Placeholder 3"/>
+          <p:cNvSpPr>
+            <a:spLocks noGrp="1"/>
+          </p:cNvSpPr>
+          <p:nvPr>
+            <p:ph type="sldNum" sz="quarter" idx="5"/>
+          </p:nvPr>
+        </p:nvSpPr>
+        <p:spPr/>
+        <p:txBody>
+          <a:bodyPr/>
+          <a:lstStyle/>
+          <a:p>
+            <a:fld id="{CD3F15BC-4AA1-41C4-8C26-91A7E3BB93DC}" type="slidenum">
+              <a:rPr lang="en-US" smtClean="0"/>
+              <a:t>21</a:t>
+            </a:fld>
+            <a:endParaRPr lang="en-US" dirty="0"/>
+          </a:p>
+        </p:txBody>
+      </p:sp>
+    </p:spTree>
+    <p:extLst>
+      <p:ext uri="{BB962C8B-B14F-4D97-AF65-F5344CB8AC3E}">
+        <p14:creationId xmlns:p14="http://schemas.microsoft.com/office/powerpoint/2010/main" val="2899438347"/>
       </p:ext>
     </p:extLst>
   </p:cSld>
@@ -10955,6 +11295,2497 @@
 </p:sld>
 </file>
 
+<file path=ppt/slides/slide18.xml><?xml version="1.0" encoding="utf-8"?>
+<p:sld xmlns:a="http://schemas.openxmlformats.org/drawingml/2006/main" xmlns:r="http://schemas.openxmlformats.org/officeDocument/2006/relationships" xmlns:p="http://schemas.openxmlformats.org/presentationml/2006/main">
+  <p:cSld>
+    <p:spTree>
+      <p:nvGrpSpPr>
+        <p:cNvPr id="1" name=""/>
+        <p:cNvGrpSpPr/>
+        <p:nvPr/>
+      </p:nvGrpSpPr>
+      <p:grpSpPr>
+        <a:xfrm>
+          <a:off x="0" y="0"/>
+          <a:ext cx="0" cy="0"/>
+          <a:chOff x="0" y="0"/>
+          <a:chExt cx="0" cy="0"/>
+        </a:xfrm>
+      </p:grpSpPr>
+      <p:sp>
+        <p:nvSpPr>
+          <p:cNvPr id="2" name="Title 1">
+            <a:extLst>
+              <a:ext uri="{FF2B5EF4-FFF2-40B4-BE49-F238E27FC236}">
+                <a16:creationId xmlns:a16="http://schemas.microsoft.com/office/drawing/2014/main" id="{921633EB-7DCB-4DDC-80AF-C885A3EE1245}"/>
+              </a:ext>
+            </a:extLst>
+          </p:cNvPr>
+          <p:cNvSpPr>
+            <a:spLocks noGrp="1"/>
+          </p:cNvSpPr>
+          <p:nvPr>
+            <p:ph type="title"/>
+          </p:nvPr>
+        </p:nvSpPr>
+        <p:spPr/>
+        <p:txBody>
+          <a:bodyPr>
+            <a:normAutofit/>
+          </a:bodyPr>
+          <a:lstStyle/>
+          <a:p>
+            <a:pPr algn="ctr"/>
+            <a:r>
+              <a:rPr lang="en-US" dirty="0" smtClean="0">
+                <a:latin typeface="Verdana" panose="020B0604030504040204" pitchFamily="34" charset="0"/>
+                <a:ea typeface="Verdana" panose="020B0604030504040204" pitchFamily="34" charset="0"/>
+              </a:rPr>
+              <a:t>Python  Keywords : Introduction</a:t>
+            </a:r>
+            <a:endParaRPr lang="en-US" dirty="0">
+              <a:latin typeface="Verdana" panose="020B0604030504040204" pitchFamily="34" charset="0"/>
+              <a:ea typeface="Verdana" panose="020B0604030504040204" pitchFamily="34" charset="0"/>
+            </a:endParaRPr>
+          </a:p>
+        </p:txBody>
+      </p:sp>
+      <p:sp>
+        <p:nvSpPr>
+          <p:cNvPr id="4" name="Content Placeholder 3"/>
+          <p:cNvSpPr>
+            <a:spLocks noGrp="1"/>
+          </p:cNvSpPr>
+          <p:nvPr>
+            <p:ph sz="half" idx="2"/>
+          </p:nvPr>
+        </p:nvSpPr>
+        <p:spPr>
+          <a:xfrm>
+            <a:off x="478972" y="2429691"/>
+            <a:ext cx="11131838" cy="1010195"/>
+          </a:xfrm>
+        </p:spPr>
+        <p:txBody>
+          <a:bodyPr>
+            <a:normAutofit/>
+          </a:bodyPr>
+          <a:lstStyle/>
+          <a:p>
+            <a:r>
+              <a:rPr lang="en-US" dirty="0"/>
+              <a:t>Python keywords are unique words reserved with defined </a:t>
+            </a:r>
+            <a:r>
+              <a:rPr lang="en-US" dirty="0" smtClean="0"/>
+              <a:t>meanings.</a:t>
+            </a:r>
+          </a:p>
+          <a:p>
+            <a:endParaRPr lang="en-US" dirty="0" smtClean="0"/>
+          </a:p>
+        </p:txBody>
+      </p:sp>
+      <p:graphicFrame>
+        <p:nvGraphicFramePr>
+          <p:cNvPr id="3" name="Table 2"/>
+          <p:cNvGraphicFramePr>
+            <a:graphicFrameLocks noGrp="1"/>
+          </p:cNvGraphicFramePr>
+          <p:nvPr>
+            <p:extLst>
+              <p:ext uri="{D42A27DB-BD31-4B8C-83A1-F6EECF244321}">
+                <p14:modId xmlns:p14="http://schemas.microsoft.com/office/powerpoint/2010/main" val="2962120342"/>
+              </p:ext>
+            </p:extLst>
+          </p:nvPr>
+        </p:nvGraphicFramePr>
+        <p:xfrm>
+          <a:off x="1878193" y="3102384"/>
+          <a:ext cx="6467475" cy="2773680"/>
+        </p:xfrm>
+        <a:graphic>
+          <a:graphicData uri="http://schemas.openxmlformats.org/drawingml/2006/table">
+            <a:tbl>
+              <a:tblPr/>
+              <a:tblGrid>
+                <a:gridCol w="1293495">
+                  <a:extLst>
+                    <a:ext uri="{9D8B030D-6E8A-4147-A177-3AD203B41FA5}">
+                      <a16:colId xmlns:a16="http://schemas.microsoft.com/office/drawing/2014/main" val="297404793"/>
+                    </a:ext>
+                  </a:extLst>
+                </a:gridCol>
+                <a:gridCol w="1293495">
+                  <a:extLst>
+                    <a:ext uri="{9D8B030D-6E8A-4147-A177-3AD203B41FA5}">
+                      <a16:colId xmlns:a16="http://schemas.microsoft.com/office/drawing/2014/main" val="7284514"/>
+                    </a:ext>
+                  </a:extLst>
+                </a:gridCol>
+                <a:gridCol w="1293495">
+                  <a:extLst>
+                    <a:ext uri="{9D8B030D-6E8A-4147-A177-3AD203B41FA5}">
+                      <a16:colId xmlns:a16="http://schemas.microsoft.com/office/drawing/2014/main" val="1276981145"/>
+                    </a:ext>
+                  </a:extLst>
+                </a:gridCol>
+                <a:gridCol w="1293495">
+                  <a:extLst>
+                    <a:ext uri="{9D8B030D-6E8A-4147-A177-3AD203B41FA5}">
+                      <a16:colId xmlns:a16="http://schemas.microsoft.com/office/drawing/2014/main" val="1350629843"/>
+                    </a:ext>
+                  </a:extLst>
+                </a:gridCol>
+                <a:gridCol w="1293495">
+                  <a:extLst>
+                    <a:ext uri="{9D8B030D-6E8A-4147-A177-3AD203B41FA5}">
+                      <a16:colId xmlns:a16="http://schemas.microsoft.com/office/drawing/2014/main" val="2231660216"/>
+                    </a:ext>
+                  </a:extLst>
+                </a:gridCol>
+              </a:tblGrid>
+              <a:tr h="0">
+                <a:tc>
+                  <a:txBody>
+                    <a:bodyPr/>
+                    <a:lstStyle/>
+                    <a:p>
+                      <a:pPr algn="just" fontAlgn="t"/>
+                      <a:r>
+                        <a:rPr lang="en-US">
+                          <a:solidFill>
+                            <a:srgbClr val="333333"/>
+                          </a:solidFill>
+                          <a:effectLst/>
+                          <a:latin typeface="inter-regular"/>
+                        </a:rPr>
+                        <a:t>False</a:t>
+                      </a:r>
+                    </a:p>
+                  </a:txBody>
+                  <a:tcPr marL="60960" marR="60960" marT="60960" marB="60960">
+                    <a:lnL w="7620" cap="flat" cmpd="sng" algn="ctr">
+                      <a:solidFill>
+                        <a:srgbClr val="C7CCBE"/>
+                      </a:solidFill>
+                      <a:prstDash val="solid"/>
+                      <a:round/>
+                      <a:headEnd type="none" w="med" len="med"/>
+                      <a:tailEnd type="none" w="med" len="med"/>
+                    </a:lnL>
+                    <a:lnR w="7620" cap="flat" cmpd="sng" algn="ctr">
+                      <a:solidFill>
+                        <a:srgbClr val="C7CCBE"/>
+                      </a:solidFill>
+                      <a:prstDash val="solid"/>
+                      <a:round/>
+                      <a:headEnd type="none" w="med" len="med"/>
+                      <a:tailEnd type="none" w="med" len="med"/>
+                    </a:lnR>
+                    <a:lnT w="7620" cap="flat" cmpd="sng" algn="ctr">
+                      <a:solidFill>
+                        <a:srgbClr val="C7CCBE"/>
+                      </a:solidFill>
+                      <a:prstDash val="solid"/>
+                      <a:round/>
+                      <a:headEnd type="none" w="med" len="med"/>
+                      <a:tailEnd type="none" w="med" len="med"/>
+                    </a:lnT>
+                    <a:lnB w="7620" cap="flat" cmpd="sng" algn="ctr">
+                      <a:solidFill>
+                        <a:srgbClr val="C7CCBE"/>
+                      </a:solidFill>
+                      <a:prstDash val="solid"/>
+                      <a:round/>
+                      <a:headEnd type="none" w="med" len="med"/>
+                      <a:tailEnd type="none" w="med" len="med"/>
+                    </a:lnB>
+                    <a:solidFill>
+                      <a:srgbClr val="EFF1EB"/>
+                    </a:solidFill>
+                  </a:tcPr>
+                </a:tc>
+                <a:tc>
+                  <a:txBody>
+                    <a:bodyPr/>
+                    <a:lstStyle/>
+                    <a:p>
+                      <a:pPr algn="just" fontAlgn="t"/>
+                      <a:r>
+                        <a:rPr lang="en-US">
+                          <a:solidFill>
+                            <a:srgbClr val="333333"/>
+                          </a:solidFill>
+                          <a:effectLst/>
+                          <a:latin typeface="inter-regular"/>
+                        </a:rPr>
+                        <a:t>await</a:t>
+                      </a:r>
+                    </a:p>
+                  </a:txBody>
+                  <a:tcPr marL="60960" marR="60960" marT="60960" marB="60960">
+                    <a:lnL w="7620" cap="flat" cmpd="sng" algn="ctr">
+                      <a:solidFill>
+                        <a:srgbClr val="C7CCBE"/>
+                      </a:solidFill>
+                      <a:prstDash val="solid"/>
+                      <a:round/>
+                      <a:headEnd type="none" w="med" len="med"/>
+                      <a:tailEnd type="none" w="med" len="med"/>
+                    </a:lnL>
+                    <a:lnR w="7620" cap="flat" cmpd="sng" algn="ctr">
+                      <a:solidFill>
+                        <a:srgbClr val="C7CCBE"/>
+                      </a:solidFill>
+                      <a:prstDash val="solid"/>
+                      <a:round/>
+                      <a:headEnd type="none" w="med" len="med"/>
+                      <a:tailEnd type="none" w="med" len="med"/>
+                    </a:lnR>
+                    <a:lnT w="7620" cap="flat" cmpd="sng" algn="ctr">
+                      <a:solidFill>
+                        <a:srgbClr val="C7CCBE"/>
+                      </a:solidFill>
+                      <a:prstDash val="solid"/>
+                      <a:round/>
+                      <a:headEnd type="none" w="med" len="med"/>
+                      <a:tailEnd type="none" w="med" len="med"/>
+                    </a:lnT>
+                    <a:lnB w="7620" cap="flat" cmpd="sng" algn="ctr">
+                      <a:solidFill>
+                        <a:srgbClr val="C7CCBE"/>
+                      </a:solidFill>
+                      <a:prstDash val="solid"/>
+                      <a:round/>
+                      <a:headEnd type="none" w="med" len="med"/>
+                      <a:tailEnd type="none" w="med" len="med"/>
+                    </a:lnB>
+                    <a:solidFill>
+                      <a:srgbClr val="EFF1EB"/>
+                    </a:solidFill>
+                  </a:tcPr>
+                </a:tc>
+                <a:tc>
+                  <a:txBody>
+                    <a:bodyPr/>
+                    <a:lstStyle/>
+                    <a:p>
+                      <a:pPr algn="just" fontAlgn="t"/>
+                      <a:r>
+                        <a:rPr lang="en-US">
+                          <a:solidFill>
+                            <a:srgbClr val="333333"/>
+                          </a:solidFill>
+                          <a:effectLst/>
+                          <a:latin typeface="inter-regular"/>
+                        </a:rPr>
+                        <a:t>else</a:t>
+                      </a:r>
+                    </a:p>
+                  </a:txBody>
+                  <a:tcPr marL="60960" marR="60960" marT="60960" marB="60960">
+                    <a:lnL w="7620" cap="flat" cmpd="sng" algn="ctr">
+                      <a:solidFill>
+                        <a:srgbClr val="C7CCBE"/>
+                      </a:solidFill>
+                      <a:prstDash val="solid"/>
+                      <a:round/>
+                      <a:headEnd type="none" w="med" len="med"/>
+                      <a:tailEnd type="none" w="med" len="med"/>
+                    </a:lnL>
+                    <a:lnR w="7620" cap="flat" cmpd="sng" algn="ctr">
+                      <a:solidFill>
+                        <a:srgbClr val="C7CCBE"/>
+                      </a:solidFill>
+                      <a:prstDash val="solid"/>
+                      <a:round/>
+                      <a:headEnd type="none" w="med" len="med"/>
+                      <a:tailEnd type="none" w="med" len="med"/>
+                    </a:lnR>
+                    <a:lnT w="7620" cap="flat" cmpd="sng" algn="ctr">
+                      <a:solidFill>
+                        <a:srgbClr val="C7CCBE"/>
+                      </a:solidFill>
+                      <a:prstDash val="solid"/>
+                      <a:round/>
+                      <a:headEnd type="none" w="med" len="med"/>
+                      <a:tailEnd type="none" w="med" len="med"/>
+                    </a:lnT>
+                    <a:lnB w="7620" cap="flat" cmpd="sng" algn="ctr">
+                      <a:solidFill>
+                        <a:srgbClr val="C7CCBE"/>
+                      </a:solidFill>
+                      <a:prstDash val="solid"/>
+                      <a:round/>
+                      <a:headEnd type="none" w="med" len="med"/>
+                      <a:tailEnd type="none" w="med" len="med"/>
+                    </a:lnB>
+                    <a:solidFill>
+                      <a:srgbClr val="EFF1EB"/>
+                    </a:solidFill>
+                  </a:tcPr>
+                </a:tc>
+                <a:tc>
+                  <a:txBody>
+                    <a:bodyPr/>
+                    <a:lstStyle/>
+                    <a:p>
+                      <a:pPr algn="just" fontAlgn="t"/>
+                      <a:r>
+                        <a:rPr lang="en-US">
+                          <a:solidFill>
+                            <a:srgbClr val="333333"/>
+                          </a:solidFill>
+                          <a:effectLst/>
+                          <a:latin typeface="inter-regular"/>
+                        </a:rPr>
+                        <a:t>import</a:t>
+                      </a:r>
+                    </a:p>
+                  </a:txBody>
+                  <a:tcPr marL="60960" marR="60960" marT="60960" marB="60960">
+                    <a:lnL w="7620" cap="flat" cmpd="sng" algn="ctr">
+                      <a:solidFill>
+                        <a:srgbClr val="C7CCBE"/>
+                      </a:solidFill>
+                      <a:prstDash val="solid"/>
+                      <a:round/>
+                      <a:headEnd type="none" w="med" len="med"/>
+                      <a:tailEnd type="none" w="med" len="med"/>
+                    </a:lnL>
+                    <a:lnR w="7620" cap="flat" cmpd="sng" algn="ctr">
+                      <a:solidFill>
+                        <a:srgbClr val="C7CCBE"/>
+                      </a:solidFill>
+                      <a:prstDash val="solid"/>
+                      <a:round/>
+                      <a:headEnd type="none" w="med" len="med"/>
+                      <a:tailEnd type="none" w="med" len="med"/>
+                    </a:lnR>
+                    <a:lnT w="7620" cap="flat" cmpd="sng" algn="ctr">
+                      <a:solidFill>
+                        <a:srgbClr val="C7CCBE"/>
+                      </a:solidFill>
+                      <a:prstDash val="solid"/>
+                      <a:round/>
+                      <a:headEnd type="none" w="med" len="med"/>
+                      <a:tailEnd type="none" w="med" len="med"/>
+                    </a:lnT>
+                    <a:lnB w="7620" cap="flat" cmpd="sng" algn="ctr">
+                      <a:solidFill>
+                        <a:srgbClr val="C7CCBE"/>
+                      </a:solidFill>
+                      <a:prstDash val="solid"/>
+                      <a:round/>
+                      <a:headEnd type="none" w="med" len="med"/>
+                      <a:tailEnd type="none" w="med" len="med"/>
+                    </a:lnB>
+                    <a:solidFill>
+                      <a:srgbClr val="EFF1EB"/>
+                    </a:solidFill>
+                  </a:tcPr>
+                </a:tc>
+                <a:tc>
+                  <a:txBody>
+                    <a:bodyPr/>
+                    <a:lstStyle/>
+                    <a:p>
+                      <a:pPr algn="just" fontAlgn="t"/>
+                      <a:r>
+                        <a:rPr lang="en-US">
+                          <a:solidFill>
+                            <a:srgbClr val="333333"/>
+                          </a:solidFill>
+                          <a:effectLst/>
+                          <a:latin typeface="inter-regular"/>
+                        </a:rPr>
+                        <a:t>pass</a:t>
+                      </a:r>
+                    </a:p>
+                  </a:txBody>
+                  <a:tcPr marL="60960" marR="60960" marT="60960" marB="60960">
+                    <a:lnL w="7620" cap="flat" cmpd="sng" algn="ctr">
+                      <a:solidFill>
+                        <a:srgbClr val="C7CCBE"/>
+                      </a:solidFill>
+                      <a:prstDash val="solid"/>
+                      <a:round/>
+                      <a:headEnd type="none" w="med" len="med"/>
+                      <a:tailEnd type="none" w="med" len="med"/>
+                    </a:lnL>
+                    <a:lnR w="7620" cap="flat" cmpd="sng" algn="ctr">
+                      <a:solidFill>
+                        <a:srgbClr val="C7CCBE"/>
+                      </a:solidFill>
+                      <a:prstDash val="solid"/>
+                      <a:round/>
+                      <a:headEnd type="none" w="med" len="med"/>
+                      <a:tailEnd type="none" w="med" len="med"/>
+                    </a:lnR>
+                    <a:lnT w="7620" cap="flat" cmpd="sng" algn="ctr">
+                      <a:solidFill>
+                        <a:srgbClr val="C7CCBE"/>
+                      </a:solidFill>
+                      <a:prstDash val="solid"/>
+                      <a:round/>
+                      <a:headEnd type="none" w="med" len="med"/>
+                      <a:tailEnd type="none" w="med" len="med"/>
+                    </a:lnT>
+                    <a:lnB w="7620" cap="flat" cmpd="sng" algn="ctr">
+                      <a:solidFill>
+                        <a:srgbClr val="C7CCBE"/>
+                      </a:solidFill>
+                      <a:prstDash val="solid"/>
+                      <a:round/>
+                      <a:headEnd type="none" w="med" len="med"/>
+                      <a:tailEnd type="none" w="med" len="med"/>
+                    </a:lnB>
+                    <a:solidFill>
+                      <a:srgbClr val="EFF1EB"/>
+                    </a:solidFill>
+                  </a:tcPr>
+                </a:tc>
+                <a:extLst>
+                  <a:ext uri="{0D108BD9-81ED-4DB2-BD59-A6C34878D82A}">
+                    <a16:rowId xmlns:a16="http://schemas.microsoft.com/office/drawing/2014/main" val="1695387964"/>
+                  </a:ext>
+                </a:extLst>
+              </a:tr>
+              <a:tr h="0">
+                <a:tc>
+                  <a:txBody>
+                    <a:bodyPr/>
+                    <a:lstStyle/>
+                    <a:p>
+                      <a:pPr algn="just" fontAlgn="t"/>
+                      <a:r>
+                        <a:rPr lang="en-US">
+                          <a:solidFill>
+                            <a:srgbClr val="333333"/>
+                          </a:solidFill>
+                          <a:effectLst/>
+                          <a:latin typeface="inter-regular"/>
+                        </a:rPr>
+                        <a:t>None</a:t>
+                      </a:r>
+                    </a:p>
+                  </a:txBody>
+                  <a:tcPr marL="60960" marR="60960" marT="60960" marB="60960">
+                    <a:lnL w="7620" cap="flat" cmpd="sng" algn="ctr">
+                      <a:solidFill>
+                        <a:srgbClr val="C7CCBE"/>
+                      </a:solidFill>
+                      <a:prstDash val="solid"/>
+                      <a:round/>
+                      <a:headEnd type="none" w="med" len="med"/>
+                      <a:tailEnd type="none" w="med" len="med"/>
+                    </a:lnL>
+                    <a:lnR w="7620" cap="flat" cmpd="sng" algn="ctr">
+                      <a:solidFill>
+                        <a:srgbClr val="C7CCBE"/>
+                      </a:solidFill>
+                      <a:prstDash val="solid"/>
+                      <a:round/>
+                      <a:headEnd type="none" w="med" len="med"/>
+                      <a:tailEnd type="none" w="med" len="med"/>
+                    </a:lnR>
+                    <a:lnT w="7620" cap="flat" cmpd="sng" algn="ctr">
+                      <a:solidFill>
+                        <a:srgbClr val="C7CCBE"/>
+                      </a:solidFill>
+                      <a:prstDash val="solid"/>
+                      <a:round/>
+                      <a:headEnd type="none" w="med" len="med"/>
+                      <a:tailEnd type="none" w="med" len="med"/>
+                    </a:lnT>
+                    <a:lnB w="7620" cap="flat" cmpd="sng" algn="ctr">
+                      <a:solidFill>
+                        <a:srgbClr val="C7CCBE"/>
+                      </a:solidFill>
+                      <a:prstDash val="solid"/>
+                      <a:round/>
+                      <a:headEnd type="none" w="med" len="med"/>
+                      <a:tailEnd type="none" w="med" len="med"/>
+                    </a:lnB>
+                    <a:solidFill>
+                      <a:srgbClr val="FFFFFF"/>
+                    </a:solidFill>
+                  </a:tcPr>
+                </a:tc>
+                <a:tc>
+                  <a:txBody>
+                    <a:bodyPr/>
+                    <a:lstStyle/>
+                    <a:p>
+                      <a:pPr algn="just" fontAlgn="t"/>
+                      <a:r>
+                        <a:rPr lang="en-US">
+                          <a:solidFill>
+                            <a:srgbClr val="333333"/>
+                          </a:solidFill>
+                          <a:effectLst/>
+                          <a:latin typeface="inter-regular"/>
+                        </a:rPr>
+                        <a:t>break</a:t>
+                      </a:r>
+                    </a:p>
+                  </a:txBody>
+                  <a:tcPr marL="60960" marR="60960" marT="60960" marB="60960">
+                    <a:lnL w="7620" cap="flat" cmpd="sng" algn="ctr">
+                      <a:solidFill>
+                        <a:srgbClr val="C7CCBE"/>
+                      </a:solidFill>
+                      <a:prstDash val="solid"/>
+                      <a:round/>
+                      <a:headEnd type="none" w="med" len="med"/>
+                      <a:tailEnd type="none" w="med" len="med"/>
+                    </a:lnL>
+                    <a:lnR w="7620" cap="flat" cmpd="sng" algn="ctr">
+                      <a:solidFill>
+                        <a:srgbClr val="C7CCBE"/>
+                      </a:solidFill>
+                      <a:prstDash val="solid"/>
+                      <a:round/>
+                      <a:headEnd type="none" w="med" len="med"/>
+                      <a:tailEnd type="none" w="med" len="med"/>
+                    </a:lnR>
+                    <a:lnT w="7620" cap="flat" cmpd="sng" algn="ctr">
+                      <a:solidFill>
+                        <a:srgbClr val="C7CCBE"/>
+                      </a:solidFill>
+                      <a:prstDash val="solid"/>
+                      <a:round/>
+                      <a:headEnd type="none" w="med" len="med"/>
+                      <a:tailEnd type="none" w="med" len="med"/>
+                    </a:lnT>
+                    <a:lnB w="7620" cap="flat" cmpd="sng" algn="ctr">
+                      <a:solidFill>
+                        <a:srgbClr val="C7CCBE"/>
+                      </a:solidFill>
+                      <a:prstDash val="solid"/>
+                      <a:round/>
+                      <a:headEnd type="none" w="med" len="med"/>
+                      <a:tailEnd type="none" w="med" len="med"/>
+                    </a:lnB>
+                    <a:solidFill>
+                      <a:srgbClr val="FFFFFF"/>
+                    </a:solidFill>
+                  </a:tcPr>
+                </a:tc>
+                <a:tc>
+                  <a:txBody>
+                    <a:bodyPr/>
+                    <a:lstStyle/>
+                    <a:p>
+                      <a:pPr algn="just" fontAlgn="t"/>
+                      <a:r>
+                        <a:rPr lang="en-US">
+                          <a:solidFill>
+                            <a:srgbClr val="333333"/>
+                          </a:solidFill>
+                          <a:effectLst/>
+                          <a:latin typeface="inter-regular"/>
+                        </a:rPr>
+                        <a:t>except</a:t>
+                      </a:r>
+                    </a:p>
+                  </a:txBody>
+                  <a:tcPr marL="60960" marR="60960" marT="60960" marB="60960">
+                    <a:lnL w="7620" cap="flat" cmpd="sng" algn="ctr">
+                      <a:solidFill>
+                        <a:srgbClr val="C7CCBE"/>
+                      </a:solidFill>
+                      <a:prstDash val="solid"/>
+                      <a:round/>
+                      <a:headEnd type="none" w="med" len="med"/>
+                      <a:tailEnd type="none" w="med" len="med"/>
+                    </a:lnL>
+                    <a:lnR w="7620" cap="flat" cmpd="sng" algn="ctr">
+                      <a:solidFill>
+                        <a:srgbClr val="C7CCBE"/>
+                      </a:solidFill>
+                      <a:prstDash val="solid"/>
+                      <a:round/>
+                      <a:headEnd type="none" w="med" len="med"/>
+                      <a:tailEnd type="none" w="med" len="med"/>
+                    </a:lnR>
+                    <a:lnT w="7620" cap="flat" cmpd="sng" algn="ctr">
+                      <a:solidFill>
+                        <a:srgbClr val="C7CCBE"/>
+                      </a:solidFill>
+                      <a:prstDash val="solid"/>
+                      <a:round/>
+                      <a:headEnd type="none" w="med" len="med"/>
+                      <a:tailEnd type="none" w="med" len="med"/>
+                    </a:lnT>
+                    <a:lnB w="7620" cap="flat" cmpd="sng" algn="ctr">
+                      <a:solidFill>
+                        <a:srgbClr val="C7CCBE"/>
+                      </a:solidFill>
+                      <a:prstDash val="solid"/>
+                      <a:round/>
+                      <a:headEnd type="none" w="med" len="med"/>
+                      <a:tailEnd type="none" w="med" len="med"/>
+                    </a:lnB>
+                    <a:solidFill>
+                      <a:srgbClr val="FFFFFF"/>
+                    </a:solidFill>
+                  </a:tcPr>
+                </a:tc>
+                <a:tc>
+                  <a:txBody>
+                    <a:bodyPr/>
+                    <a:lstStyle/>
+                    <a:p>
+                      <a:pPr algn="just" fontAlgn="t"/>
+                      <a:r>
+                        <a:rPr lang="en-US">
+                          <a:solidFill>
+                            <a:srgbClr val="333333"/>
+                          </a:solidFill>
+                          <a:effectLst/>
+                          <a:latin typeface="inter-regular"/>
+                        </a:rPr>
+                        <a:t>in</a:t>
+                      </a:r>
+                    </a:p>
+                  </a:txBody>
+                  <a:tcPr marL="60960" marR="60960" marT="60960" marB="60960">
+                    <a:lnL w="7620" cap="flat" cmpd="sng" algn="ctr">
+                      <a:solidFill>
+                        <a:srgbClr val="C7CCBE"/>
+                      </a:solidFill>
+                      <a:prstDash val="solid"/>
+                      <a:round/>
+                      <a:headEnd type="none" w="med" len="med"/>
+                      <a:tailEnd type="none" w="med" len="med"/>
+                    </a:lnL>
+                    <a:lnR w="7620" cap="flat" cmpd="sng" algn="ctr">
+                      <a:solidFill>
+                        <a:srgbClr val="C7CCBE"/>
+                      </a:solidFill>
+                      <a:prstDash val="solid"/>
+                      <a:round/>
+                      <a:headEnd type="none" w="med" len="med"/>
+                      <a:tailEnd type="none" w="med" len="med"/>
+                    </a:lnR>
+                    <a:lnT w="7620" cap="flat" cmpd="sng" algn="ctr">
+                      <a:solidFill>
+                        <a:srgbClr val="C7CCBE"/>
+                      </a:solidFill>
+                      <a:prstDash val="solid"/>
+                      <a:round/>
+                      <a:headEnd type="none" w="med" len="med"/>
+                      <a:tailEnd type="none" w="med" len="med"/>
+                    </a:lnT>
+                    <a:lnB w="7620" cap="flat" cmpd="sng" algn="ctr">
+                      <a:solidFill>
+                        <a:srgbClr val="C7CCBE"/>
+                      </a:solidFill>
+                      <a:prstDash val="solid"/>
+                      <a:round/>
+                      <a:headEnd type="none" w="med" len="med"/>
+                      <a:tailEnd type="none" w="med" len="med"/>
+                    </a:lnB>
+                    <a:solidFill>
+                      <a:srgbClr val="FFFFFF"/>
+                    </a:solidFill>
+                  </a:tcPr>
+                </a:tc>
+                <a:tc>
+                  <a:txBody>
+                    <a:bodyPr/>
+                    <a:lstStyle/>
+                    <a:p>
+                      <a:pPr algn="just" fontAlgn="t"/>
+                      <a:r>
+                        <a:rPr lang="en-US">
+                          <a:solidFill>
+                            <a:srgbClr val="333333"/>
+                          </a:solidFill>
+                          <a:effectLst/>
+                          <a:latin typeface="inter-regular"/>
+                        </a:rPr>
+                        <a:t>raise</a:t>
+                      </a:r>
+                    </a:p>
+                  </a:txBody>
+                  <a:tcPr marL="60960" marR="60960" marT="60960" marB="60960">
+                    <a:lnL w="7620" cap="flat" cmpd="sng" algn="ctr">
+                      <a:solidFill>
+                        <a:srgbClr val="C7CCBE"/>
+                      </a:solidFill>
+                      <a:prstDash val="solid"/>
+                      <a:round/>
+                      <a:headEnd type="none" w="med" len="med"/>
+                      <a:tailEnd type="none" w="med" len="med"/>
+                    </a:lnL>
+                    <a:lnR w="7620" cap="flat" cmpd="sng" algn="ctr">
+                      <a:solidFill>
+                        <a:srgbClr val="C7CCBE"/>
+                      </a:solidFill>
+                      <a:prstDash val="solid"/>
+                      <a:round/>
+                      <a:headEnd type="none" w="med" len="med"/>
+                      <a:tailEnd type="none" w="med" len="med"/>
+                    </a:lnR>
+                    <a:lnT w="7620" cap="flat" cmpd="sng" algn="ctr">
+                      <a:solidFill>
+                        <a:srgbClr val="C7CCBE"/>
+                      </a:solidFill>
+                      <a:prstDash val="solid"/>
+                      <a:round/>
+                      <a:headEnd type="none" w="med" len="med"/>
+                      <a:tailEnd type="none" w="med" len="med"/>
+                    </a:lnT>
+                    <a:lnB w="7620" cap="flat" cmpd="sng" algn="ctr">
+                      <a:solidFill>
+                        <a:srgbClr val="C7CCBE"/>
+                      </a:solidFill>
+                      <a:prstDash val="solid"/>
+                      <a:round/>
+                      <a:headEnd type="none" w="med" len="med"/>
+                      <a:tailEnd type="none" w="med" len="med"/>
+                    </a:lnB>
+                    <a:solidFill>
+                      <a:srgbClr val="FFFFFF"/>
+                    </a:solidFill>
+                  </a:tcPr>
+                </a:tc>
+                <a:extLst>
+                  <a:ext uri="{0D108BD9-81ED-4DB2-BD59-A6C34878D82A}">
+                    <a16:rowId xmlns:a16="http://schemas.microsoft.com/office/drawing/2014/main" val="878019729"/>
+                  </a:ext>
+                </a:extLst>
+              </a:tr>
+              <a:tr h="0">
+                <a:tc>
+                  <a:txBody>
+                    <a:bodyPr/>
+                    <a:lstStyle/>
+                    <a:p>
+                      <a:pPr algn="just" fontAlgn="t"/>
+                      <a:r>
+                        <a:rPr lang="en-US">
+                          <a:solidFill>
+                            <a:srgbClr val="333333"/>
+                          </a:solidFill>
+                          <a:effectLst/>
+                          <a:latin typeface="inter-regular"/>
+                        </a:rPr>
+                        <a:t>True</a:t>
+                      </a:r>
+                    </a:p>
+                  </a:txBody>
+                  <a:tcPr marL="60960" marR="60960" marT="60960" marB="60960">
+                    <a:lnL w="7620" cap="flat" cmpd="sng" algn="ctr">
+                      <a:solidFill>
+                        <a:srgbClr val="C7CCBE"/>
+                      </a:solidFill>
+                      <a:prstDash val="solid"/>
+                      <a:round/>
+                      <a:headEnd type="none" w="med" len="med"/>
+                      <a:tailEnd type="none" w="med" len="med"/>
+                    </a:lnL>
+                    <a:lnR w="7620" cap="flat" cmpd="sng" algn="ctr">
+                      <a:solidFill>
+                        <a:srgbClr val="C7CCBE"/>
+                      </a:solidFill>
+                      <a:prstDash val="solid"/>
+                      <a:round/>
+                      <a:headEnd type="none" w="med" len="med"/>
+                      <a:tailEnd type="none" w="med" len="med"/>
+                    </a:lnR>
+                    <a:lnT w="7620" cap="flat" cmpd="sng" algn="ctr">
+                      <a:solidFill>
+                        <a:srgbClr val="C7CCBE"/>
+                      </a:solidFill>
+                      <a:prstDash val="solid"/>
+                      <a:round/>
+                      <a:headEnd type="none" w="med" len="med"/>
+                      <a:tailEnd type="none" w="med" len="med"/>
+                    </a:lnT>
+                    <a:lnB w="7620" cap="flat" cmpd="sng" algn="ctr">
+                      <a:solidFill>
+                        <a:srgbClr val="C7CCBE"/>
+                      </a:solidFill>
+                      <a:prstDash val="solid"/>
+                      <a:round/>
+                      <a:headEnd type="none" w="med" len="med"/>
+                      <a:tailEnd type="none" w="med" len="med"/>
+                    </a:lnB>
+                    <a:solidFill>
+                      <a:srgbClr val="EFF1EB"/>
+                    </a:solidFill>
+                  </a:tcPr>
+                </a:tc>
+                <a:tc>
+                  <a:txBody>
+                    <a:bodyPr/>
+                    <a:lstStyle/>
+                    <a:p>
+                      <a:pPr algn="just" fontAlgn="t"/>
+                      <a:r>
+                        <a:rPr lang="en-US">
+                          <a:solidFill>
+                            <a:srgbClr val="333333"/>
+                          </a:solidFill>
+                          <a:effectLst/>
+                          <a:latin typeface="inter-regular"/>
+                        </a:rPr>
+                        <a:t>class</a:t>
+                      </a:r>
+                    </a:p>
+                  </a:txBody>
+                  <a:tcPr marL="60960" marR="60960" marT="60960" marB="60960">
+                    <a:lnL w="7620" cap="flat" cmpd="sng" algn="ctr">
+                      <a:solidFill>
+                        <a:srgbClr val="C7CCBE"/>
+                      </a:solidFill>
+                      <a:prstDash val="solid"/>
+                      <a:round/>
+                      <a:headEnd type="none" w="med" len="med"/>
+                      <a:tailEnd type="none" w="med" len="med"/>
+                    </a:lnL>
+                    <a:lnR w="7620" cap="flat" cmpd="sng" algn="ctr">
+                      <a:solidFill>
+                        <a:srgbClr val="C7CCBE"/>
+                      </a:solidFill>
+                      <a:prstDash val="solid"/>
+                      <a:round/>
+                      <a:headEnd type="none" w="med" len="med"/>
+                      <a:tailEnd type="none" w="med" len="med"/>
+                    </a:lnR>
+                    <a:lnT w="7620" cap="flat" cmpd="sng" algn="ctr">
+                      <a:solidFill>
+                        <a:srgbClr val="C7CCBE"/>
+                      </a:solidFill>
+                      <a:prstDash val="solid"/>
+                      <a:round/>
+                      <a:headEnd type="none" w="med" len="med"/>
+                      <a:tailEnd type="none" w="med" len="med"/>
+                    </a:lnT>
+                    <a:lnB w="7620" cap="flat" cmpd="sng" algn="ctr">
+                      <a:solidFill>
+                        <a:srgbClr val="C7CCBE"/>
+                      </a:solidFill>
+                      <a:prstDash val="solid"/>
+                      <a:round/>
+                      <a:headEnd type="none" w="med" len="med"/>
+                      <a:tailEnd type="none" w="med" len="med"/>
+                    </a:lnB>
+                    <a:solidFill>
+                      <a:srgbClr val="EFF1EB"/>
+                    </a:solidFill>
+                  </a:tcPr>
+                </a:tc>
+                <a:tc>
+                  <a:txBody>
+                    <a:bodyPr/>
+                    <a:lstStyle/>
+                    <a:p>
+                      <a:pPr algn="just" fontAlgn="t"/>
+                      <a:r>
+                        <a:rPr lang="en-US">
+                          <a:solidFill>
+                            <a:srgbClr val="333333"/>
+                          </a:solidFill>
+                          <a:effectLst/>
+                          <a:latin typeface="inter-regular"/>
+                        </a:rPr>
+                        <a:t>finally</a:t>
+                      </a:r>
+                    </a:p>
+                  </a:txBody>
+                  <a:tcPr marL="60960" marR="60960" marT="60960" marB="60960">
+                    <a:lnL w="7620" cap="flat" cmpd="sng" algn="ctr">
+                      <a:solidFill>
+                        <a:srgbClr val="C7CCBE"/>
+                      </a:solidFill>
+                      <a:prstDash val="solid"/>
+                      <a:round/>
+                      <a:headEnd type="none" w="med" len="med"/>
+                      <a:tailEnd type="none" w="med" len="med"/>
+                    </a:lnL>
+                    <a:lnR w="7620" cap="flat" cmpd="sng" algn="ctr">
+                      <a:solidFill>
+                        <a:srgbClr val="C7CCBE"/>
+                      </a:solidFill>
+                      <a:prstDash val="solid"/>
+                      <a:round/>
+                      <a:headEnd type="none" w="med" len="med"/>
+                      <a:tailEnd type="none" w="med" len="med"/>
+                    </a:lnR>
+                    <a:lnT w="7620" cap="flat" cmpd="sng" algn="ctr">
+                      <a:solidFill>
+                        <a:srgbClr val="C7CCBE"/>
+                      </a:solidFill>
+                      <a:prstDash val="solid"/>
+                      <a:round/>
+                      <a:headEnd type="none" w="med" len="med"/>
+                      <a:tailEnd type="none" w="med" len="med"/>
+                    </a:lnT>
+                    <a:lnB w="7620" cap="flat" cmpd="sng" algn="ctr">
+                      <a:solidFill>
+                        <a:srgbClr val="C7CCBE"/>
+                      </a:solidFill>
+                      <a:prstDash val="solid"/>
+                      <a:round/>
+                      <a:headEnd type="none" w="med" len="med"/>
+                      <a:tailEnd type="none" w="med" len="med"/>
+                    </a:lnB>
+                    <a:solidFill>
+                      <a:srgbClr val="EFF1EB"/>
+                    </a:solidFill>
+                  </a:tcPr>
+                </a:tc>
+                <a:tc>
+                  <a:txBody>
+                    <a:bodyPr/>
+                    <a:lstStyle/>
+                    <a:p>
+                      <a:pPr algn="just" fontAlgn="t"/>
+                      <a:r>
+                        <a:rPr lang="en-US">
+                          <a:solidFill>
+                            <a:srgbClr val="333333"/>
+                          </a:solidFill>
+                          <a:effectLst/>
+                          <a:latin typeface="inter-regular"/>
+                        </a:rPr>
+                        <a:t>is</a:t>
+                      </a:r>
+                    </a:p>
+                  </a:txBody>
+                  <a:tcPr marL="60960" marR="60960" marT="60960" marB="60960">
+                    <a:lnL w="7620" cap="flat" cmpd="sng" algn="ctr">
+                      <a:solidFill>
+                        <a:srgbClr val="C7CCBE"/>
+                      </a:solidFill>
+                      <a:prstDash val="solid"/>
+                      <a:round/>
+                      <a:headEnd type="none" w="med" len="med"/>
+                      <a:tailEnd type="none" w="med" len="med"/>
+                    </a:lnL>
+                    <a:lnR w="7620" cap="flat" cmpd="sng" algn="ctr">
+                      <a:solidFill>
+                        <a:srgbClr val="C7CCBE"/>
+                      </a:solidFill>
+                      <a:prstDash val="solid"/>
+                      <a:round/>
+                      <a:headEnd type="none" w="med" len="med"/>
+                      <a:tailEnd type="none" w="med" len="med"/>
+                    </a:lnR>
+                    <a:lnT w="7620" cap="flat" cmpd="sng" algn="ctr">
+                      <a:solidFill>
+                        <a:srgbClr val="C7CCBE"/>
+                      </a:solidFill>
+                      <a:prstDash val="solid"/>
+                      <a:round/>
+                      <a:headEnd type="none" w="med" len="med"/>
+                      <a:tailEnd type="none" w="med" len="med"/>
+                    </a:lnT>
+                    <a:lnB w="7620" cap="flat" cmpd="sng" algn="ctr">
+                      <a:solidFill>
+                        <a:srgbClr val="C7CCBE"/>
+                      </a:solidFill>
+                      <a:prstDash val="solid"/>
+                      <a:round/>
+                      <a:headEnd type="none" w="med" len="med"/>
+                      <a:tailEnd type="none" w="med" len="med"/>
+                    </a:lnB>
+                    <a:solidFill>
+                      <a:srgbClr val="EFF1EB"/>
+                    </a:solidFill>
+                  </a:tcPr>
+                </a:tc>
+                <a:tc>
+                  <a:txBody>
+                    <a:bodyPr/>
+                    <a:lstStyle/>
+                    <a:p>
+                      <a:pPr algn="just" fontAlgn="t"/>
+                      <a:r>
+                        <a:rPr lang="en-US">
+                          <a:solidFill>
+                            <a:srgbClr val="333333"/>
+                          </a:solidFill>
+                          <a:effectLst/>
+                          <a:latin typeface="inter-regular"/>
+                        </a:rPr>
+                        <a:t>return</a:t>
+                      </a:r>
+                    </a:p>
+                  </a:txBody>
+                  <a:tcPr marL="60960" marR="60960" marT="60960" marB="60960">
+                    <a:lnL w="7620" cap="flat" cmpd="sng" algn="ctr">
+                      <a:solidFill>
+                        <a:srgbClr val="C7CCBE"/>
+                      </a:solidFill>
+                      <a:prstDash val="solid"/>
+                      <a:round/>
+                      <a:headEnd type="none" w="med" len="med"/>
+                      <a:tailEnd type="none" w="med" len="med"/>
+                    </a:lnL>
+                    <a:lnR w="7620" cap="flat" cmpd="sng" algn="ctr">
+                      <a:solidFill>
+                        <a:srgbClr val="C7CCBE"/>
+                      </a:solidFill>
+                      <a:prstDash val="solid"/>
+                      <a:round/>
+                      <a:headEnd type="none" w="med" len="med"/>
+                      <a:tailEnd type="none" w="med" len="med"/>
+                    </a:lnR>
+                    <a:lnT w="7620" cap="flat" cmpd="sng" algn="ctr">
+                      <a:solidFill>
+                        <a:srgbClr val="C7CCBE"/>
+                      </a:solidFill>
+                      <a:prstDash val="solid"/>
+                      <a:round/>
+                      <a:headEnd type="none" w="med" len="med"/>
+                      <a:tailEnd type="none" w="med" len="med"/>
+                    </a:lnT>
+                    <a:lnB w="7620" cap="flat" cmpd="sng" algn="ctr">
+                      <a:solidFill>
+                        <a:srgbClr val="C7CCBE"/>
+                      </a:solidFill>
+                      <a:prstDash val="solid"/>
+                      <a:round/>
+                      <a:headEnd type="none" w="med" len="med"/>
+                      <a:tailEnd type="none" w="med" len="med"/>
+                    </a:lnB>
+                    <a:solidFill>
+                      <a:srgbClr val="EFF1EB"/>
+                    </a:solidFill>
+                  </a:tcPr>
+                </a:tc>
+                <a:extLst>
+                  <a:ext uri="{0D108BD9-81ED-4DB2-BD59-A6C34878D82A}">
+                    <a16:rowId xmlns:a16="http://schemas.microsoft.com/office/drawing/2014/main" val="2739853620"/>
+                  </a:ext>
+                </a:extLst>
+              </a:tr>
+              <a:tr h="0">
+                <a:tc>
+                  <a:txBody>
+                    <a:bodyPr/>
+                    <a:lstStyle/>
+                    <a:p>
+                      <a:pPr algn="just" fontAlgn="t"/>
+                      <a:r>
+                        <a:rPr lang="en-US">
+                          <a:solidFill>
+                            <a:srgbClr val="333333"/>
+                          </a:solidFill>
+                          <a:effectLst/>
+                          <a:latin typeface="inter-regular"/>
+                        </a:rPr>
+                        <a:t>and</a:t>
+                      </a:r>
+                    </a:p>
+                  </a:txBody>
+                  <a:tcPr marL="60960" marR="60960" marT="60960" marB="60960">
+                    <a:lnL w="7620" cap="flat" cmpd="sng" algn="ctr">
+                      <a:solidFill>
+                        <a:srgbClr val="C7CCBE"/>
+                      </a:solidFill>
+                      <a:prstDash val="solid"/>
+                      <a:round/>
+                      <a:headEnd type="none" w="med" len="med"/>
+                      <a:tailEnd type="none" w="med" len="med"/>
+                    </a:lnL>
+                    <a:lnR w="7620" cap="flat" cmpd="sng" algn="ctr">
+                      <a:solidFill>
+                        <a:srgbClr val="C7CCBE"/>
+                      </a:solidFill>
+                      <a:prstDash val="solid"/>
+                      <a:round/>
+                      <a:headEnd type="none" w="med" len="med"/>
+                      <a:tailEnd type="none" w="med" len="med"/>
+                    </a:lnR>
+                    <a:lnT w="7620" cap="flat" cmpd="sng" algn="ctr">
+                      <a:solidFill>
+                        <a:srgbClr val="C7CCBE"/>
+                      </a:solidFill>
+                      <a:prstDash val="solid"/>
+                      <a:round/>
+                      <a:headEnd type="none" w="med" len="med"/>
+                      <a:tailEnd type="none" w="med" len="med"/>
+                    </a:lnT>
+                    <a:lnB w="7620" cap="flat" cmpd="sng" algn="ctr">
+                      <a:solidFill>
+                        <a:srgbClr val="C7CCBE"/>
+                      </a:solidFill>
+                      <a:prstDash val="solid"/>
+                      <a:round/>
+                      <a:headEnd type="none" w="med" len="med"/>
+                      <a:tailEnd type="none" w="med" len="med"/>
+                    </a:lnB>
+                    <a:solidFill>
+                      <a:srgbClr val="FFFFFF"/>
+                    </a:solidFill>
+                  </a:tcPr>
+                </a:tc>
+                <a:tc>
+                  <a:txBody>
+                    <a:bodyPr/>
+                    <a:lstStyle/>
+                    <a:p>
+                      <a:pPr algn="just" fontAlgn="t"/>
+                      <a:r>
+                        <a:rPr lang="en-US">
+                          <a:solidFill>
+                            <a:srgbClr val="333333"/>
+                          </a:solidFill>
+                          <a:effectLst/>
+                          <a:latin typeface="inter-regular"/>
+                        </a:rPr>
+                        <a:t>continue</a:t>
+                      </a:r>
+                    </a:p>
+                  </a:txBody>
+                  <a:tcPr marL="60960" marR="60960" marT="60960" marB="60960">
+                    <a:lnL w="7620" cap="flat" cmpd="sng" algn="ctr">
+                      <a:solidFill>
+                        <a:srgbClr val="C7CCBE"/>
+                      </a:solidFill>
+                      <a:prstDash val="solid"/>
+                      <a:round/>
+                      <a:headEnd type="none" w="med" len="med"/>
+                      <a:tailEnd type="none" w="med" len="med"/>
+                    </a:lnL>
+                    <a:lnR w="7620" cap="flat" cmpd="sng" algn="ctr">
+                      <a:solidFill>
+                        <a:srgbClr val="C7CCBE"/>
+                      </a:solidFill>
+                      <a:prstDash val="solid"/>
+                      <a:round/>
+                      <a:headEnd type="none" w="med" len="med"/>
+                      <a:tailEnd type="none" w="med" len="med"/>
+                    </a:lnR>
+                    <a:lnT w="7620" cap="flat" cmpd="sng" algn="ctr">
+                      <a:solidFill>
+                        <a:srgbClr val="C7CCBE"/>
+                      </a:solidFill>
+                      <a:prstDash val="solid"/>
+                      <a:round/>
+                      <a:headEnd type="none" w="med" len="med"/>
+                      <a:tailEnd type="none" w="med" len="med"/>
+                    </a:lnT>
+                    <a:lnB w="7620" cap="flat" cmpd="sng" algn="ctr">
+                      <a:solidFill>
+                        <a:srgbClr val="C7CCBE"/>
+                      </a:solidFill>
+                      <a:prstDash val="solid"/>
+                      <a:round/>
+                      <a:headEnd type="none" w="med" len="med"/>
+                      <a:tailEnd type="none" w="med" len="med"/>
+                    </a:lnB>
+                    <a:solidFill>
+                      <a:srgbClr val="FFFFFF"/>
+                    </a:solidFill>
+                  </a:tcPr>
+                </a:tc>
+                <a:tc>
+                  <a:txBody>
+                    <a:bodyPr/>
+                    <a:lstStyle/>
+                    <a:p>
+                      <a:pPr algn="just" fontAlgn="t"/>
+                      <a:r>
+                        <a:rPr lang="en-US">
+                          <a:solidFill>
+                            <a:srgbClr val="333333"/>
+                          </a:solidFill>
+                          <a:effectLst/>
+                          <a:latin typeface="inter-regular"/>
+                        </a:rPr>
+                        <a:t>for</a:t>
+                      </a:r>
+                    </a:p>
+                  </a:txBody>
+                  <a:tcPr marL="60960" marR="60960" marT="60960" marB="60960">
+                    <a:lnL w="7620" cap="flat" cmpd="sng" algn="ctr">
+                      <a:solidFill>
+                        <a:srgbClr val="C7CCBE"/>
+                      </a:solidFill>
+                      <a:prstDash val="solid"/>
+                      <a:round/>
+                      <a:headEnd type="none" w="med" len="med"/>
+                      <a:tailEnd type="none" w="med" len="med"/>
+                    </a:lnL>
+                    <a:lnR w="7620" cap="flat" cmpd="sng" algn="ctr">
+                      <a:solidFill>
+                        <a:srgbClr val="C7CCBE"/>
+                      </a:solidFill>
+                      <a:prstDash val="solid"/>
+                      <a:round/>
+                      <a:headEnd type="none" w="med" len="med"/>
+                      <a:tailEnd type="none" w="med" len="med"/>
+                    </a:lnR>
+                    <a:lnT w="7620" cap="flat" cmpd="sng" algn="ctr">
+                      <a:solidFill>
+                        <a:srgbClr val="C7CCBE"/>
+                      </a:solidFill>
+                      <a:prstDash val="solid"/>
+                      <a:round/>
+                      <a:headEnd type="none" w="med" len="med"/>
+                      <a:tailEnd type="none" w="med" len="med"/>
+                    </a:lnT>
+                    <a:lnB w="7620" cap="flat" cmpd="sng" algn="ctr">
+                      <a:solidFill>
+                        <a:srgbClr val="C7CCBE"/>
+                      </a:solidFill>
+                      <a:prstDash val="solid"/>
+                      <a:round/>
+                      <a:headEnd type="none" w="med" len="med"/>
+                      <a:tailEnd type="none" w="med" len="med"/>
+                    </a:lnB>
+                    <a:solidFill>
+                      <a:srgbClr val="FFFFFF"/>
+                    </a:solidFill>
+                  </a:tcPr>
+                </a:tc>
+                <a:tc>
+                  <a:txBody>
+                    <a:bodyPr/>
+                    <a:lstStyle/>
+                    <a:p>
+                      <a:pPr algn="just" fontAlgn="t"/>
+                      <a:r>
+                        <a:rPr lang="en-US">
+                          <a:solidFill>
+                            <a:srgbClr val="333333"/>
+                          </a:solidFill>
+                          <a:effectLst/>
+                          <a:latin typeface="inter-regular"/>
+                        </a:rPr>
+                        <a:t>lambda</a:t>
+                      </a:r>
+                    </a:p>
+                  </a:txBody>
+                  <a:tcPr marL="60960" marR="60960" marT="60960" marB="60960">
+                    <a:lnL w="7620" cap="flat" cmpd="sng" algn="ctr">
+                      <a:solidFill>
+                        <a:srgbClr val="C7CCBE"/>
+                      </a:solidFill>
+                      <a:prstDash val="solid"/>
+                      <a:round/>
+                      <a:headEnd type="none" w="med" len="med"/>
+                      <a:tailEnd type="none" w="med" len="med"/>
+                    </a:lnL>
+                    <a:lnR w="7620" cap="flat" cmpd="sng" algn="ctr">
+                      <a:solidFill>
+                        <a:srgbClr val="C7CCBE"/>
+                      </a:solidFill>
+                      <a:prstDash val="solid"/>
+                      <a:round/>
+                      <a:headEnd type="none" w="med" len="med"/>
+                      <a:tailEnd type="none" w="med" len="med"/>
+                    </a:lnR>
+                    <a:lnT w="7620" cap="flat" cmpd="sng" algn="ctr">
+                      <a:solidFill>
+                        <a:srgbClr val="C7CCBE"/>
+                      </a:solidFill>
+                      <a:prstDash val="solid"/>
+                      <a:round/>
+                      <a:headEnd type="none" w="med" len="med"/>
+                      <a:tailEnd type="none" w="med" len="med"/>
+                    </a:lnT>
+                    <a:lnB w="7620" cap="flat" cmpd="sng" algn="ctr">
+                      <a:solidFill>
+                        <a:srgbClr val="C7CCBE"/>
+                      </a:solidFill>
+                      <a:prstDash val="solid"/>
+                      <a:round/>
+                      <a:headEnd type="none" w="med" len="med"/>
+                      <a:tailEnd type="none" w="med" len="med"/>
+                    </a:lnB>
+                    <a:solidFill>
+                      <a:srgbClr val="FFFFFF"/>
+                    </a:solidFill>
+                  </a:tcPr>
+                </a:tc>
+                <a:tc>
+                  <a:txBody>
+                    <a:bodyPr/>
+                    <a:lstStyle/>
+                    <a:p>
+                      <a:pPr algn="just" fontAlgn="t"/>
+                      <a:r>
+                        <a:rPr lang="en-US">
+                          <a:solidFill>
+                            <a:srgbClr val="333333"/>
+                          </a:solidFill>
+                          <a:effectLst/>
+                          <a:latin typeface="inter-regular"/>
+                        </a:rPr>
+                        <a:t>try</a:t>
+                      </a:r>
+                    </a:p>
+                  </a:txBody>
+                  <a:tcPr marL="60960" marR="60960" marT="60960" marB="60960">
+                    <a:lnL w="7620" cap="flat" cmpd="sng" algn="ctr">
+                      <a:solidFill>
+                        <a:srgbClr val="C7CCBE"/>
+                      </a:solidFill>
+                      <a:prstDash val="solid"/>
+                      <a:round/>
+                      <a:headEnd type="none" w="med" len="med"/>
+                      <a:tailEnd type="none" w="med" len="med"/>
+                    </a:lnL>
+                    <a:lnR w="7620" cap="flat" cmpd="sng" algn="ctr">
+                      <a:solidFill>
+                        <a:srgbClr val="C7CCBE"/>
+                      </a:solidFill>
+                      <a:prstDash val="solid"/>
+                      <a:round/>
+                      <a:headEnd type="none" w="med" len="med"/>
+                      <a:tailEnd type="none" w="med" len="med"/>
+                    </a:lnR>
+                    <a:lnT w="7620" cap="flat" cmpd="sng" algn="ctr">
+                      <a:solidFill>
+                        <a:srgbClr val="C7CCBE"/>
+                      </a:solidFill>
+                      <a:prstDash val="solid"/>
+                      <a:round/>
+                      <a:headEnd type="none" w="med" len="med"/>
+                      <a:tailEnd type="none" w="med" len="med"/>
+                    </a:lnT>
+                    <a:lnB w="7620" cap="flat" cmpd="sng" algn="ctr">
+                      <a:solidFill>
+                        <a:srgbClr val="C7CCBE"/>
+                      </a:solidFill>
+                      <a:prstDash val="solid"/>
+                      <a:round/>
+                      <a:headEnd type="none" w="med" len="med"/>
+                      <a:tailEnd type="none" w="med" len="med"/>
+                    </a:lnB>
+                    <a:solidFill>
+                      <a:srgbClr val="FFFFFF"/>
+                    </a:solidFill>
+                  </a:tcPr>
+                </a:tc>
+                <a:extLst>
+                  <a:ext uri="{0D108BD9-81ED-4DB2-BD59-A6C34878D82A}">
+                    <a16:rowId xmlns:a16="http://schemas.microsoft.com/office/drawing/2014/main" val="2451633432"/>
+                  </a:ext>
+                </a:extLst>
+              </a:tr>
+              <a:tr h="0">
+                <a:tc>
+                  <a:txBody>
+                    <a:bodyPr/>
+                    <a:lstStyle/>
+                    <a:p>
+                      <a:pPr algn="just" fontAlgn="t"/>
+                      <a:r>
+                        <a:rPr lang="en-US">
+                          <a:solidFill>
+                            <a:srgbClr val="333333"/>
+                          </a:solidFill>
+                          <a:effectLst/>
+                          <a:latin typeface="inter-regular"/>
+                        </a:rPr>
+                        <a:t>as</a:t>
+                      </a:r>
+                    </a:p>
+                  </a:txBody>
+                  <a:tcPr marL="60960" marR="60960" marT="60960" marB="60960">
+                    <a:lnL w="7620" cap="flat" cmpd="sng" algn="ctr">
+                      <a:solidFill>
+                        <a:srgbClr val="C7CCBE"/>
+                      </a:solidFill>
+                      <a:prstDash val="solid"/>
+                      <a:round/>
+                      <a:headEnd type="none" w="med" len="med"/>
+                      <a:tailEnd type="none" w="med" len="med"/>
+                    </a:lnL>
+                    <a:lnR w="7620" cap="flat" cmpd="sng" algn="ctr">
+                      <a:solidFill>
+                        <a:srgbClr val="C7CCBE"/>
+                      </a:solidFill>
+                      <a:prstDash val="solid"/>
+                      <a:round/>
+                      <a:headEnd type="none" w="med" len="med"/>
+                      <a:tailEnd type="none" w="med" len="med"/>
+                    </a:lnR>
+                    <a:lnT w="7620" cap="flat" cmpd="sng" algn="ctr">
+                      <a:solidFill>
+                        <a:srgbClr val="C7CCBE"/>
+                      </a:solidFill>
+                      <a:prstDash val="solid"/>
+                      <a:round/>
+                      <a:headEnd type="none" w="med" len="med"/>
+                      <a:tailEnd type="none" w="med" len="med"/>
+                    </a:lnT>
+                    <a:lnB w="7620" cap="flat" cmpd="sng" algn="ctr">
+                      <a:solidFill>
+                        <a:srgbClr val="C7CCBE"/>
+                      </a:solidFill>
+                      <a:prstDash val="solid"/>
+                      <a:round/>
+                      <a:headEnd type="none" w="med" len="med"/>
+                      <a:tailEnd type="none" w="med" len="med"/>
+                    </a:lnB>
+                    <a:solidFill>
+                      <a:srgbClr val="EFF1EB"/>
+                    </a:solidFill>
+                  </a:tcPr>
+                </a:tc>
+                <a:tc>
+                  <a:txBody>
+                    <a:bodyPr/>
+                    <a:lstStyle/>
+                    <a:p>
+                      <a:pPr algn="just" fontAlgn="t"/>
+                      <a:r>
+                        <a:rPr lang="en-US">
+                          <a:solidFill>
+                            <a:srgbClr val="333333"/>
+                          </a:solidFill>
+                          <a:effectLst/>
+                          <a:latin typeface="inter-regular"/>
+                        </a:rPr>
+                        <a:t>def</a:t>
+                      </a:r>
+                    </a:p>
+                  </a:txBody>
+                  <a:tcPr marL="60960" marR="60960" marT="60960" marB="60960">
+                    <a:lnL w="7620" cap="flat" cmpd="sng" algn="ctr">
+                      <a:solidFill>
+                        <a:srgbClr val="C7CCBE"/>
+                      </a:solidFill>
+                      <a:prstDash val="solid"/>
+                      <a:round/>
+                      <a:headEnd type="none" w="med" len="med"/>
+                      <a:tailEnd type="none" w="med" len="med"/>
+                    </a:lnL>
+                    <a:lnR w="7620" cap="flat" cmpd="sng" algn="ctr">
+                      <a:solidFill>
+                        <a:srgbClr val="C7CCBE"/>
+                      </a:solidFill>
+                      <a:prstDash val="solid"/>
+                      <a:round/>
+                      <a:headEnd type="none" w="med" len="med"/>
+                      <a:tailEnd type="none" w="med" len="med"/>
+                    </a:lnR>
+                    <a:lnT w="7620" cap="flat" cmpd="sng" algn="ctr">
+                      <a:solidFill>
+                        <a:srgbClr val="C7CCBE"/>
+                      </a:solidFill>
+                      <a:prstDash val="solid"/>
+                      <a:round/>
+                      <a:headEnd type="none" w="med" len="med"/>
+                      <a:tailEnd type="none" w="med" len="med"/>
+                    </a:lnT>
+                    <a:lnB w="7620" cap="flat" cmpd="sng" algn="ctr">
+                      <a:solidFill>
+                        <a:srgbClr val="C7CCBE"/>
+                      </a:solidFill>
+                      <a:prstDash val="solid"/>
+                      <a:round/>
+                      <a:headEnd type="none" w="med" len="med"/>
+                      <a:tailEnd type="none" w="med" len="med"/>
+                    </a:lnB>
+                    <a:solidFill>
+                      <a:srgbClr val="EFF1EB"/>
+                    </a:solidFill>
+                  </a:tcPr>
+                </a:tc>
+                <a:tc>
+                  <a:txBody>
+                    <a:bodyPr/>
+                    <a:lstStyle/>
+                    <a:p>
+                      <a:pPr algn="just" fontAlgn="t"/>
+                      <a:r>
+                        <a:rPr lang="en-US">
+                          <a:solidFill>
+                            <a:srgbClr val="333333"/>
+                          </a:solidFill>
+                          <a:effectLst/>
+                          <a:latin typeface="inter-regular"/>
+                        </a:rPr>
+                        <a:t>from</a:t>
+                      </a:r>
+                    </a:p>
+                  </a:txBody>
+                  <a:tcPr marL="60960" marR="60960" marT="60960" marB="60960">
+                    <a:lnL w="7620" cap="flat" cmpd="sng" algn="ctr">
+                      <a:solidFill>
+                        <a:srgbClr val="C7CCBE"/>
+                      </a:solidFill>
+                      <a:prstDash val="solid"/>
+                      <a:round/>
+                      <a:headEnd type="none" w="med" len="med"/>
+                      <a:tailEnd type="none" w="med" len="med"/>
+                    </a:lnL>
+                    <a:lnR w="7620" cap="flat" cmpd="sng" algn="ctr">
+                      <a:solidFill>
+                        <a:srgbClr val="C7CCBE"/>
+                      </a:solidFill>
+                      <a:prstDash val="solid"/>
+                      <a:round/>
+                      <a:headEnd type="none" w="med" len="med"/>
+                      <a:tailEnd type="none" w="med" len="med"/>
+                    </a:lnR>
+                    <a:lnT w="7620" cap="flat" cmpd="sng" algn="ctr">
+                      <a:solidFill>
+                        <a:srgbClr val="C7CCBE"/>
+                      </a:solidFill>
+                      <a:prstDash val="solid"/>
+                      <a:round/>
+                      <a:headEnd type="none" w="med" len="med"/>
+                      <a:tailEnd type="none" w="med" len="med"/>
+                    </a:lnT>
+                    <a:lnB w="7620" cap="flat" cmpd="sng" algn="ctr">
+                      <a:solidFill>
+                        <a:srgbClr val="C7CCBE"/>
+                      </a:solidFill>
+                      <a:prstDash val="solid"/>
+                      <a:round/>
+                      <a:headEnd type="none" w="med" len="med"/>
+                      <a:tailEnd type="none" w="med" len="med"/>
+                    </a:lnB>
+                    <a:solidFill>
+                      <a:srgbClr val="EFF1EB"/>
+                    </a:solidFill>
+                  </a:tcPr>
+                </a:tc>
+                <a:tc>
+                  <a:txBody>
+                    <a:bodyPr/>
+                    <a:lstStyle/>
+                    <a:p>
+                      <a:pPr algn="just" fontAlgn="t"/>
+                      <a:r>
+                        <a:rPr lang="en-US">
+                          <a:solidFill>
+                            <a:srgbClr val="333333"/>
+                          </a:solidFill>
+                          <a:effectLst/>
+                          <a:latin typeface="inter-regular"/>
+                        </a:rPr>
+                        <a:t>nonlocal</a:t>
+                      </a:r>
+                    </a:p>
+                  </a:txBody>
+                  <a:tcPr marL="60960" marR="60960" marT="60960" marB="60960">
+                    <a:lnL w="7620" cap="flat" cmpd="sng" algn="ctr">
+                      <a:solidFill>
+                        <a:srgbClr val="C7CCBE"/>
+                      </a:solidFill>
+                      <a:prstDash val="solid"/>
+                      <a:round/>
+                      <a:headEnd type="none" w="med" len="med"/>
+                      <a:tailEnd type="none" w="med" len="med"/>
+                    </a:lnL>
+                    <a:lnR w="7620" cap="flat" cmpd="sng" algn="ctr">
+                      <a:solidFill>
+                        <a:srgbClr val="C7CCBE"/>
+                      </a:solidFill>
+                      <a:prstDash val="solid"/>
+                      <a:round/>
+                      <a:headEnd type="none" w="med" len="med"/>
+                      <a:tailEnd type="none" w="med" len="med"/>
+                    </a:lnR>
+                    <a:lnT w="7620" cap="flat" cmpd="sng" algn="ctr">
+                      <a:solidFill>
+                        <a:srgbClr val="C7CCBE"/>
+                      </a:solidFill>
+                      <a:prstDash val="solid"/>
+                      <a:round/>
+                      <a:headEnd type="none" w="med" len="med"/>
+                      <a:tailEnd type="none" w="med" len="med"/>
+                    </a:lnT>
+                    <a:lnB w="7620" cap="flat" cmpd="sng" algn="ctr">
+                      <a:solidFill>
+                        <a:srgbClr val="C7CCBE"/>
+                      </a:solidFill>
+                      <a:prstDash val="solid"/>
+                      <a:round/>
+                      <a:headEnd type="none" w="med" len="med"/>
+                      <a:tailEnd type="none" w="med" len="med"/>
+                    </a:lnB>
+                    <a:solidFill>
+                      <a:srgbClr val="EFF1EB"/>
+                    </a:solidFill>
+                  </a:tcPr>
+                </a:tc>
+                <a:tc>
+                  <a:txBody>
+                    <a:bodyPr/>
+                    <a:lstStyle/>
+                    <a:p>
+                      <a:pPr algn="just" fontAlgn="t"/>
+                      <a:r>
+                        <a:rPr lang="en-US">
+                          <a:solidFill>
+                            <a:srgbClr val="333333"/>
+                          </a:solidFill>
+                          <a:effectLst/>
+                          <a:latin typeface="inter-regular"/>
+                        </a:rPr>
+                        <a:t>while</a:t>
+                      </a:r>
+                    </a:p>
+                  </a:txBody>
+                  <a:tcPr marL="60960" marR="60960" marT="60960" marB="60960">
+                    <a:lnL w="7620" cap="flat" cmpd="sng" algn="ctr">
+                      <a:solidFill>
+                        <a:srgbClr val="C7CCBE"/>
+                      </a:solidFill>
+                      <a:prstDash val="solid"/>
+                      <a:round/>
+                      <a:headEnd type="none" w="med" len="med"/>
+                      <a:tailEnd type="none" w="med" len="med"/>
+                    </a:lnL>
+                    <a:lnR w="7620" cap="flat" cmpd="sng" algn="ctr">
+                      <a:solidFill>
+                        <a:srgbClr val="C7CCBE"/>
+                      </a:solidFill>
+                      <a:prstDash val="solid"/>
+                      <a:round/>
+                      <a:headEnd type="none" w="med" len="med"/>
+                      <a:tailEnd type="none" w="med" len="med"/>
+                    </a:lnR>
+                    <a:lnT w="7620" cap="flat" cmpd="sng" algn="ctr">
+                      <a:solidFill>
+                        <a:srgbClr val="C7CCBE"/>
+                      </a:solidFill>
+                      <a:prstDash val="solid"/>
+                      <a:round/>
+                      <a:headEnd type="none" w="med" len="med"/>
+                      <a:tailEnd type="none" w="med" len="med"/>
+                    </a:lnT>
+                    <a:lnB w="7620" cap="flat" cmpd="sng" algn="ctr">
+                      <a:solidFill>
+                        <a:srgbClr val="C7CCBE"/>
+                      </a:solidFill>
+                      <a:prstDash val="solid"/>
+                      <a:round/>
+                      <a:headEnd type="none" w="med" len="med"/>
+                      <a:tailEnd type="none" w="med" len="med"/>
+                    </a:lnB>
+                    <a:solidFill>
+                      <a:srgbClr val="EFF1EB"/>
+                    </a:solidFill>
+                  </a:tcPr>
+                </a:tc>
+                <a:extLst>
+                  <a:ext uri="{0D108BD9-81ED-4DB2-BD59-A6C34878D82A}">
+                    <a16:rowId xmlns:a16="http://schemas.microsoft.com/office/drawing/2014/main" val="2059457847"/>
+                  </a:ext>
+                </a:extLst>
+              </a:tr>
+              <a:tr h="0">
+                <a:tc>
+                  <a:txBody>
+                    <a:bodyPr/>
+                    <a:lstStyle/>
+                    <a:p>
+                      <a:pPr algn="just" fontAlgn="t"/>
+                      <a:r>
+                        <a:rPr lang="en-US">
+                          <a:solidFill>
+                            <a:srgbClr val="333333"/>
+                          </a:solidFill>
+                          <a:effectLst/>
+                          <a:latin typeface="inter-regular"/>
+                        </a:rPr>
+                        <a:t>assert</a:t>
+                      </a:r>
+                    </a:p>
+                  </a:txBody>
+                  <a:tcPr marL="60960" marR="60960" marT="60960" marB="60960">
+                    <a:lnL w="7620" cap="flat" cmpd="sng" algn="ctr">
+                      <a:solidFill>
+                        <a:srgbClr val="C7CCBE"/>
+                      </a:solidFill>
+                      <a:prstDash val="solid"/>
+                      <a:round/>
+                      <a:headEnd type="none" w="med" len="med"/>
+                      <a:tailEnd type="none" w="med" len="med"/>
+                    </a:lnL>
+                    <a:lnR w="7620" cap="flat" cmpd="sng" algn="ctr">
+                      <a:solidFill>
+                        <a:srgbClr val="C7CCBE"/>
+                      </a:solidFill>
+                      <a:prstDash val="solid"/>
+                      <a:round/>
+                      <a:headEnd type="none" w="med" len="med"/>
+                      <a:tailEnd type="none" w="med" len="med"/>
+                    </a:lnR>
+                    <a:lnT w="7620" cap="flat" cmpd="sng" algn="ctr">
+                      <a:solidFill>
+                        <a:srgbClr val="C7CCBE"/>
+                      </a:solidFill>
+                      <a:prstDash val="solid"/>
+                      <a:round/>
+                      <a:headEnd type="none" w="med" len="med"/>
+                      <a:tailEnd type="none" w="med" len="med"/>
+                    </a:lnT>
+                    <a:lnB w="7620" cap="flat" cmpd="sng" algn="ctr">
+                      <a:solidFill>
+                        <a:srgbClr val="C7CCBE"/>
+                      </a:solidFill>
+                      <a:prstDash val="solid"/>
+                      <a:round/>
+                      <a:headEnd type="none" w="med" len="med"/>
+                      <a:tailEnd type="none" w="med" len="med"/>
+                    </a:lnB>
+                    <a:solidFill>
+                      <a:srgbClr val="FFFFFF"/>
+                    </a:solidFill>
+                  </a:tcPr>
+                </a:tc>
+                <a:tc>
+                  <a:txBody>
+                    <a:bodyPr/>
+                    <a:lstStyle/>
+                    <a:p>
+                      <a:pPr algn="just" fontAlgn="t"/>
+                      <a:r>
+                        <a:rPr lang="en-US">
+                          <a:solidFill>
+                            <a:srgbClr val="333333"/>
+                          </a:solidFill>
+                          <a:effectLst/>
+                          <a:latin typeface="inter-regular"/>
+                        </a:rPr>
+                        <a:t>del</a:t>
+                      </a:r>
+                    </a:p>
+                  </a:txBody>
+                  <a:tcPr marL="60960" marR="60960" marT="60960" marB="60960">
+                    <a:lnL w="7620" cap="flat" cmpd="sng" algn="ctr">
+                      <a:solidFill>
+                        <a:srgbClr val="C7CCBE"/>
+                      </a:solidFill>
+                      <a:prstDash val="solid"/>
+                      <a:round/>
+                      <a:headEnd type="none" w="med" len="med"/>
+                      <a:tailEnd type="none" w="med" len="med"/>
+                    </a:lnL>
+                    <a:lnR w="7620" cap="flat" cmpd="sng" algn="ctr">
+                      <a:solidFill>
+                        <a:srgbClr val="C7CCBE"/>
+                      </a:solidFill>
+                      <a:prstDash val="solid"/>
+                      <a:round/>
+                      <a:headEnd type="none" w="med" len="med"/>
+                      <a:tailEnd type="none" w="med" len="med"/>
+                    </a:lnR>
+                    <a:lnT w="7620" cap="flat" cmpd="sng" algn="ctr">
+                      <a:solidFill>
+                        <a:srgbClr val="C7CCBE"/>
+                      </a:solidFill>
+                      <a:prstDash val="solid"/>
+                      <a:round/>
+                      <a:headEnd type="none" w="med" len="med"/>
+                      <a:tailEnd type="none" w="med" len="med"/>
+                    </a:lnT>
+                    <a:lnB w="7620" cap="flat" cmpd="sng" algn="ctr">
+                      <a:solidFill>
+                        <a:srgbClr val="C7CCBE"/>
+                      </a:solidFill>
+                      <a:prstDash val="solid"/>
+                      <a:round/>
+                      <a:headEnd type="none" w="med" len="med"/>
+                      <a:tailEnd type="none" w="med" len="med"/>
+                    </a:lnB>
+                    <a:solidFill>
+                      <a:srgbClr val="FFFFFF"/>
+                    </a:solidFill>
+                  </a:tcPr>
+                </a:tc>
+                <a:tc>
+                  <a:txBody>
+                    <a:bodyPr/>
+                    <a:lstStyle/>
+                    <a:p>
+                      <a:pPr algn="just" fontAlgn="t"/>
+                      <a:r>
+                        <a:rPr lang="en-US">
+                          <a:solidFill>
+                            <a:srgbClr val="333333"/>
+                          </a:solidFill>
+                          <a:effectLst/>
+                          <a:latin typeface="inter-regular"/>
+                        </a:rPr>
+                        <a:t>global</a:t>
+                      </a:r>
+                    </a:p>
+                  </a:txBody>
+                  <a:tcPr marL="60960" marR="60960" marT="60960" marB="60960">
+                    <a:lnL w="7620" cap="flat" cmpd="sng" algn="ctr">
+                      <a:solidFill>
+                        <a:srgbClr val="C7CCBE"/>
+                      </a:solidFill>
+                      <a:prstDash val="solid"/>
+                      <a:round/>
+                      <a:headEnd type="none" w="med" len="med"/>
+                      <a:tailEnd type="none" w="med" len="med"/>
+                    </a:lnL>
+                    <a:lnR w="7620" cap="flat" cmpd="sng" algn="ctr">
+                      <a:solidFill>
+                        <a:srgbClr val="C7CCBE"/>
+                      </a:solidFill>
+                      <a:prstDash val="solid"/>
+                      <a:round/>
+                      <a:headEnd type="none" w="med" len="med"/>
+                      <a:tailEnd type="none" w="med" len="med"/>
+                    </a:lnR>
+                    <a:lnT w="7620" cap="flat" cmpd="sng" algn="ctr">
+                      <a:solidFill>
+                        <a:srgbClr val="C7CCBE"/>
+                      </a:solidFill>
+                      <a:prstDash val="solid"/>
+                      <a:round/>
+                      <a:headEnd type="none" w="med" len="med"/>
+                      <a:tailEnd type="none" w="med" len="med"/>
+                    </a:lnT>
+                    <a:lnB w="7620" cap="flat" cmpd="sng" algn="ctr">
+                      <a:solidFill>
+                        <a:srgbClr val="C7CCBE"/>
+                      </a:solidFill>
+                      <a:prstDash val="solid"/>
+                      <a:round/>
+                      <a:headEnd type="none" w="med" len="med"/>
+                      <a:tailEnd type="none" w="med" len="med"/>
+                    </a:lnB>
+                    <a:solidFill>
+                      <a:srgbClr val="FFFFFF"/>
+                    </a:solidFill>
+                  </a:tcPr>
+                </a:tc>
+                <a:tc>
+                  <a:txBody>
+                    <a:bodyPr/>
+                    <a:lstStyle/>
+                    <a:p>
+                      <a:pPr algn="just" fontAlgn="t"/>
+                      <a:r>
+                        <a:rPr lang="en-US">
+                          <a:solidFill>
+                            <a:srgbClr val="333333"/>
+                          </a:solidFill>
+                          <a:effectLst/>
+                          <a:latin typeface="inter-regular"/>
+                        </a:rPr>
+                        <a:t>not</a:t>
+                      </a:r>
+                    </a:p>
+                  </a:txBody>
+                  <a:tcPr marL="60960" marR="60960" marT="60960" marB="60960">
+                    <a:lnL w="7620" cap="flat" cmpd="sng" algn="ctr">
+                      <a:solidFill>
+                        <a:srgbClr val="C7CCBE"/>
+                      </a:solidFill>
+                      <a:prstDash val="solid"/>
+                      <a:round/>
+                      <a:headEnd type="none" w="med" len="med"/>
+                      <a:tailEnd type="none" w="med" len="med"/>
+                    </a:lnL>
+                    <a:lnR w="7620" cap="flat" cmpd="sng" algn="ctr">
+                      <a:solidFill>
+                        <a:srgbClr val="C7CCBE"/>
+                      </a:solidFill>
+                      <a:prstDash val="solid"/>
+                      <a:round/>
+                      <a:headEnd type="none" w="med" len="med"/>
+                      <a:tailEnd type="none" w="med" len="med"/>
+                    </a:lnR>
+                    <a:lnT w="7620" cap="flat" cmpd="sng" algn="ctr">
+                      <a:solidFill>
+                        <a:srgbClr val="C7CCBE"/>
+                      </a:solidFill>
+                      <a:prstDash val="solid"/>
+                      <a:round/>
+                      <a:headEnd type="none" w="med" len="med"/>
+                      <a:tailEnd type="none" w="med" len="med"/>
+                    </a:lnT>
+                    <a:lnB w="7620" cap="flat" cmpd="sng" algn="ctr">
+                      <a:solidFill>
+                        <a:srgbClr val="C7CCBE"/>
+                      </a:solidFill>
+                      <a:prstDash val="solid"/>
+                      <a:round/>
+                      <a:headEnd type="none" w="med" len="med"/>
+                      <a:tailEnd type="none" w="med" len="med"/>
+                    </a:lnB>
+                    <a:solidFill>
+                      <a:srgbClr val="FFFFFF"/>
+                    </a:solidFill>
+                  </a:tcPr>
+                </a:tc>
+                <a:tc>
+                  <a:txBody>
+                    <a:bodyPr/>
+                    <a:lstStyle/>
+                    <a:p>
+                      <a:pPr algn="just" fontAlgn="t"/>
+                      <a:r>
+                        <a:rPr lang="en-US">
+                          <a:solidFill>
+                            <a:srgbClr val="333333"/>
+                          </a:solidFill>
+                          <a:effectLst/>
+                          <a:latin typeface="inter-regular"/>
+                        </a:rPr>
+                        <a:t>with</a:t>
+                      </a:r>
+                    </a:p>
+                  </a:txBody>
+                  <a:tcPr marL="60960" marR="60960" marT="60960" marB="60960">
+                    <a:lnL w="7620" cap="flat" cmpd="sng" algn="ctr">
+                      <a:solidFill>
+                        <a:srgbClr val="C7CCBE"/>
+                      </a:solidFill>
+                      <a:prstDash val="solid"/>
+                      <a:round/>
+                      <a:headEnd type="none" w="med" len="med"/>
+                      <a:tailEnd type="none" w="med" len="med"/>
+                    </a:lnL>
+                    <a:lnR w="7620" cap="flat" cmpd="sng" algn="ctr">
+                      <a:solidFill>
+                        <a:srgbClr val="C7CCBE"/>
+                      </a:solidFill>
+                      <a:prstDash val="solid"/>
+                      <a:round/>
+                      <a:headEnd type="none" w="med" len="med"/>
+                      <a:tailEnd type="none" w="med" len="med"/>
+                    </a:lnR>
+                    <a:lnT w="7620" cap="flat" cmpd="sng" algn="ctr">
+                      <a:solidFill>
+                        <a:srgbClr val="C7CCBE"/>
+                      </a:solidFill>
+                      <a:prstDash val="solid"/>
+                      <a:round/>
+                      <a:headEnd type="none" w="med" len="med"/>
+                      <a:tailEnd type="none" w="med" len="med"/>
+                    </a:lnT>
+                    <a:lnB w="7620" cap="flat" cmpd="sng" algn="ctr">
+                      <a:solidFill>
+                        <a:srgbClr val="C7CCBE"/>
+                      </a:solidFill>
+                      <a:prstDash val="solid"/>
+                      <a:round/>
+                      <a:headEnd type="none" w="med" len="med"/>
+                      <a:tailEnd type="none" w="med" len="med"/>
+                    </a:lnB>
+                    <a:solidFill>
+                      <a:srgbClr val="FFFFFF"/>
+                    </a:solidFill>
+                  </a:tcPr>
+                </a:tc>
+                <a:extLst>
+                  <a:ext uri="{0D108BD9-81ED-4DB2-BD59-A6C34878D82A}">
+                    <a16:rowId xmlns:a16="http://schemas.microsoft.com/office/drawing/2014/main" val="1488880494"/>
+                  </a:ext>
+                </a:extLst>
+              </a:tr>
+              <a:tr h="0">
+                <a:tc>
+                  <a:txBody>
+                    <a:bodyPr/>
+                    <a:lstStyle/>
+                    <a:p>
+                      <a:pPr algn="just" fontAlgn="t"/>
+                      <a:r>
+                        <a:rPr lang="en-US">
+                          <a:solidFill>
+                            <a:srgbClr val="333333"/>
+                          </a:solidFill>
+                          <a:effectLst/>
+                          <a:latin typeface="inter-regular"/>
+                        </a:rPr>
+                        <a:t>async</a:t>
+                      </a:r>
+                    </a:p>
+                  </a:txBody>
+                  <a:tcPr marL="60960" marR="60960" marT="60960" marB="60960">
+                    <a:lnL w="7620" cap="flat" cmpd="sng" algn="ctr">
+                      <a:solidFill>
+                        <a:srgbClr val="C7CCBE"/>
+                      </a:solidFill>
+                      <a:prstDash val="solid"/>
+                      <a:round/>
+                      <a:headEnd type="none" w="med" len="med"/>
+                      <a:tailEnd type="none" w="med" len="med"/>
+                    </a:lnL>
+                    <a:lnR w="7620" cap="flat" cmpd="sng" algn="ctr">
+                      <a:solidFill>
+                        <a:srgbClr val="C7CCBE"/>
+                      </a:solidFill>
+                      <a:prstDash val="solid"/>
+                      <a:round/>
+                      <a:headEnd type="none" w="med" len="med"/>
+                      <a:tailEnd type="none" w="med" len="med"/>
+                    </a:lnR>
+                    <a:lnT w="7620" cap="flat" cmpd="sng" algn="ctr">
+                      <a:solidFill>
+                        <a:srgbClr val="C7CCBE"/>
+                      </a:solidFill>
+                      <a:prstDash val="solid"/>
+                      <a:round/>
+                      <a:headEnd type="none" w="med" len="med"/>
+                      <a:tailEnd type="none" w="med" len="med"/>
+                    </a:lnT>
+                    <a:lnB w="7620" cap="flat" cmpd="sng" algn="ctr">
+                      <a:solidFill>
+                        <a:srgbClr val="C7CCBE"/>
+                      </a:solidFill>
+                      <a:prstDash val="solid"/>
+                      <a:round/>
+                      <a:headEnd type="none" w="med" len="med"/>
+                      <a:tailEnd type="none" w="med" len="med"/>
+                    </a:lnB>
+                    <a:solidFill>
+                      <a:srgbClr val="EFF1EB"/>
+                    </a:solidFill>
+                  </a:tcPr>
+                </a:tc>
+                <a:tc>
+                  <a:txBody>
+                    <a:bodyPr/>
+                    <a:lstStyle/>
+                    <a:p>
+                      <a:pPr algn="just" fontAlgn="t"/>
+                      <a:r>
+                        <a:rPr lang="en-US">
+                          <a:solidFill>
+                            <a:srgbClr val="333333"/>
+                          </a:solidFill>
+                          <a:effectLst/>
+                          <a:latin typeface="inter-regular"/>
+                        </a:rPr>
+                        <a:t>elif</a:t>
+                      </a:r>
+                    </a:p>
+                  </a:txBody>
+                  <a:tcPr marL="60960" marR="60960" marT="60960" marB="60960">
+                    <a:lnL w="7620" cap="flat" cmpd="sng" algn="ctr">
+                      <a:solidFill>
+                        <a:srgbClr val="C7CCBE"/>
+                      </a:solidFill>
+                      <a:prstDash val="solid"/>
+                      <a:round/>
+                      <a:headEnd type="none" w="med" len="med"/>
+                      <a:tailEnd type="none" w="med" len="med"/>
+                    </a:lnL>
+                    <a:lnR w="7620" cap="flat" cmpd="sng" algn="ctr">
+                      <a:solidFill>
+                        <a:srgbClr val="C7CCBE"/>
+                      </a:solidFill>
+                      <a:prstDash val="solid"/>
+                      <a:round/>
+                      <a:headEnd type="none" w="med" len="med"/>
+                      <a:tailEnd type="none" w="med" len="med"/>
+                    </a:lnR>
+                    <a:lnT w="7620" cap="flat" cmpd="sng" algn="ctr">
+                      <a:solidFill>
+                        <a:srgbClr val="C7CCBE"/>
+                      </a:solidFill>
+                      <a:prstDash val="solid"/>
+                      <a:round/>
+                      <a:headEnd type="none" w="med" len="med"/>
+                      <a:tailEnd type="none" w="med" len="med"/>
+                    </a:lnT>
+                    <a:lnB w="7620" cap="flat" cmpd="sng" algn="ctr">
+                      <a:solidFill>
+                        <a:srgbClr val="C7CCBE"/>
+                      </a:solidFill>
+                      <a:prstDash val="solid"/>
+                      <a:round/>
+                      <a:headEnd type="none" w="med" len="med"/>
+                      <a:tailEnd type="none" w="med" len="med"/>
+                    </a:lnB>
+                    <a:solidFill>
+                      <a:srgbClr val="EFF1EB"/>
+                    </a:solidFill>
+                  </a:tcPr>
+                </a:tc>
+                <a:tc>
+                  <a:txBody>
+                    <a:bodyPr/>
+                    <a:lstStyle/>
+                    <a:p>
+                      <a:pPr algn="just" fontAlgn="t"/>
+                      <a:r>
+                        <a:rPr lang="en-US">
+                          <a:solidFill>
+                            <a:srgbClr val="333333"/>
+                          </a:solidFill>
+                          <a:effectLst/>
+                          <a:latin typeface="inter-regular"/>
+                        </a:rPr>
+                        <a:t>if</a:t>
+                      </a:r>
+                    </a:p>
+                  </a:txBody>
+                  <a:tcPr marL="60960" marR="60960" marT="60960" marB="60960">
+                    <a:lnL w="7620" cap="flat" cmpd="sng" algn="ctr">
+                      <a:solidFill>
+                        <a:srgbClr val="C7CCBE"/>
+                      </a:solidFill>
+                      <a:prstDash val="solid"/>
+                      <a:round/>
+                      <a:headEnd type="none" w="med" len="med"/>
+                      <a:tailEnd type="none" w="med" len="med"/>
+                    </a:lnL>
+                    <a:lnR w="7620" cap="flat" cmpd="sng" algn="ctr">
+                      <a:solidFill>
+                        <a:srgbClr val="C7CCBE"/>
+                      </a:solidFill>
+                      <a:prstDash val="solid"/>
+                      <a:round/>
+                      <a:headEnd type="none" w="med" len="med"/>
+                      <a:tailEnd type="none" w="med" len="med"/>
+                    </a:lnR>
+                    <a:lnT w="7620" cap="flat" cmpd="sng" algn="ctr">
+                      <a:solidFill>
+                        <a:srgbClr val="C7CCBE"/>
+                      </a:solidFill>
+                      <a:prstDash val="solid"/>
+                      <a:round/>
+                      <a:headEnd type="none" w="med" len="med"/>
+                      <a:tailEnd type="none" w="med" len="med"/>
+                    </a:lnT>
+                    <a:lnB w="7620" cap="flat" cmpd="sng" algn="ctr">
+                      <a:solidFill>
+                        <a:srgbClr val="C7CCBE"/>
+                      </a:solidFill>
+                      <a:prstDash val="solid"/>
+                      <a:round/>
+                      <a:headEnd type="none" w="med" len="med"/>
+                      <a:tailEnd type="none" w="med" len="med"/>
+                    </a:lnB>
+                    <a:solidFill>
+                      <a:srgbClr val="EFF1EB"/>
+                    </a:solidFill>
+                  </a:tcPr>
+                </a:tc>
+                <a:tc>
+                  <a:txBody>
+                    <a:bodyPr/>
+                    <a:lstStyle/>
+                    <a:p>
+                      <a:pPr algn="just" fontAlgn="t"/>
+                      <a:r>
+                        <a:rPr lang="en-US">
+                          <a:solidFill>
+                            <a:srgbClr val="333333"/>
+                          </a:solidFill>
+                          <a:effectLst/>
+                          <a:latin typeface="inter-regular"/>
+                        </a:rPr>
+                        <a:t>or</a:t>
+                      </a:r>
+                    </a:p>
+                  </a:txBody>
+                  <a:tcPr marL="60960" marR="60960" marT="60960" marB="60960">
+                    <a:lnL w="7620" cap="flat" cmpd="sng" algn="ctr">
+                      <a:solidFill>
+                        <a:srgbClr val="C7CCBE"/>
+                      </a:solidFill>
+                      <a:prstDash val="solid"/>
+                      <a:round/>
+                      <a:headEnd type="none" w="med" len="med"/>
+                      <a:tailEnd type="none" w="med" len="med"/>
+                    </a:lnL>
+                    <a:lnR w="7620" cap="flat" cmpd="sng" algn="ctr">
+                      <a:solidFill>
+                        <a:srgbClr val="C7CCBE"/>
+                      </a:solidFill>
+                      <a:prstDash val="solid"/>
+                      <a:round/>
+                      <a:headEnd type="none" w="med" len="med"/>
+                      <a:tailEnd type="none" w="med" len="med"/>
+                    </a:lnR>
+                    <a:lnT w="7620" cap="flat" cmpd="sng" algn="ctr">
+                      <a:solidFill>
+                        <a:srgbClr val="C7CCBE"/>
+                      </a:solidFill>
+                      <a:prstDash val="solid"/>
+                      <a:round/>
+                      <a:headEnd type="none" w="med" len="med"/>
+                      <a:tailEnd type="none" w="med" len="med"/>
+                    </a:lnT>
+                    <a:lnB w="7620" cap="flat" cmpd="sng" algn="ctr">
+                      <a:solidFill>
+                        <a:srgbClr val="C7CCBE"/>
+                      </a:solidFill>
+                      <a:prstDash val="solid"/>
+                      <a:round/>
+                      <a:headEnd type="none" w="med" len="med"/>
+                      <a:tailEnd type="none" w="med" len="med"/>
+                    </a:lnB>
+                    <a:solidFill>
+                      <a:srgbClr val="EFF1EB"/>
+                    </a:solidFill>
+                  </a:tcPr>
+                </a:tc>
+                <a:tc>
+                  <a:txBody>
+                    <a:bodyPr/>
+                    <a:lstStyle/>
+                    <a:p>
+                      <a:pPr algn="just" fontAlgn="t"/>
+                      <a:r>
+                        <a:rPr lang="en-US" dirty="0">
+                          <a:solidFill>
+                            <a:srgbClr val="333333"/>
+                          </a:solidFill>
+                          <a:effectLst/>
+                          <a:latin typeface="inter-regular"/>
+                        </a:rPr>
+                        <a:t>yield</a:t>
+                      </a:r>
+                    </a:p>
+                  </a:txBody>
+                  <a:tcPr marL="60960" marR="60960" marT="60960" marB="60960">
+                    <a:lnL w="7620" cap="flat" cmpd="sng" algn="ctr">
+                      <a:solidFill>
+                        <a:srgbClr val="C7CCBE"/>
+                      </a:solidFill>
+                      <a:prstDash val="solid"/>
+                      <a:round/>
+                      <a:headEnd type="none" w="med" len="med"/>
+                      <a:tailEnd type="none" w="med" len="med"/>
+                    </a:lnL>
+                    <a:lnR w="7620" cap="flat" cmpd="sng" algn="ctr">
+                      <a:solidFill>
+                        <a:srgbClr val="C7CCBE"/>
+                      </a:solidFill>
+                      <a:prstDash val="solid"/>
+                      <a:round/>
+                      <a:headEnd type="none" w="med" len="med"/>
+                      <a:tailEnd type="none" w="med" len="med"/>
+                    </a:lnR>
+                    <a:lnT w="7620" cap="flat" cmpd="sng" algn="ctr">
+                      <a:solidFill>
+                        <a:srgbClr val="C7CCBE"/>
+                      </a:solidFill>
+                      <a:prstDash val="solid"/>
+                      <a:round/>
+                      <a:headEnd type="none" w="med" len="med"/>
+                      <a:tailEnd type="none" w="med" len="med"/>
+                    </a:lnT>
+                    <a:lnB w="7620" cap="flat" cmpd="sng" algn="ctr">
+                      <a:solidFill>
+                        <a:srgbClr val="C7CCBE"/>
+                      </a:solidFill>
+                      <a:prstDash val="solid"/>
+                      <a:round/>
+                      <a:headEnd type="none" w="med" len="med"/>
+                      <a:tailEnd type="none" w="med" len="med"/>
+                    </a:lnB>
+                    <a:solidFill>
+                      <a:srgbClr val="EFF1EB"/>
+                    </a:solidFill>
+                  </a:tcPr>
+                </a:tc>
+                <a:extLst>
+                  <a:ext uri="{0D108BD9-81ED-4DB2-BD59-A6C34878D82A}">
+                    <a16:rowId xmlns:a16="http://schemas.microsoft.com/office/drawing/2014/main" val="1912673"/>
+                  </a:ext>
+                </a:extLst>
+              </a:tr>
+            </a:tbl>
+          </a:graphicData>
+        </a:graphic>
+      </p:graphicFrame>
+    </p:spTree>
+    <p:extLst>
+      <p:ext uri="{BB962C8B-B14F-4D97-AF65-F5344CB8AC3E}">
+        <p14:creationId xmlns:p14="http://schemas.microsoft.com/office/powerpoint/2010/main" val="3700527761"/>
+      </p:ext>
+    </p:extLst>
+  </p:cSld>
+  <p:clrMapOvr>
+    <a:masterClrMapping/>
+  </p:clrMapOvr>
+</p:sld>
+</file>
+
+<file path=ppt/slides/slide19.xml><?xml version="1.0" encoding="utf-8"?>
+<p:sld xmlns:a="http://schemas.openxmlformats.org/drawingml/2006/main" xmlns:r="http://schemas.openxmlformats.org/officeDocument/2006/relationships" xmlns:p="http://schemas.openxmlformats.org/presentationml/2006/main">
+  <p:cSld>
+    <p:spTree>
+      <p:nvGrpSpPr>
+        <p:cNvPr id="1" name=""/>
+        <p:cNvGrpSpPr/>
+        <p:nvPr/>
+      </p:nvGrpSpPr>
+      <p:grpSpPr>
+        <a:xfrm>
+          <a:off x="0" y="0"/>
+          <a:ext cx="0" cy="0"/>
+          <a:chOff x="0" y="0"/>
+          <a:chExt cx="0" cy="0"/>
+        </a:xfrm>
+      </p:grpSpPr>
+      <p:sp>
+        <p:nvSpPr>
+          <p:cNvPr id="2" name="Title 1">
+            <a:extLst>
+              <a:ext uri="{FF2B5EF4-FFF2-40B4-BE49-F238E27FC236}">
+                <a16:creationId xmlns:a16="http://schemas.microsoft.com/office/drawing/2014/main" id="{921633EB-7DCB-4DDC-80AF-C885A3EE1245}"/>
+              </a:ext>
+            </a:extLst>
+          </p:cNvPr>
+          <p:cNvSpPr>
+            <a:spLocks noGrp="1"/>
+          </p:cNvSpPr>
+          <p:nvPr>
+            <p:ph type="title"/>
+          </p:nvPr>
+        </p:nvSpPr>
+        <p:spPr/>
+        <p:txBody>
+          <a:bodyPr>
+            <a:normAutofit/>
+          </a:bodyPr>
+          <a:lstStyle/>
+          <a:p>
+            <a:pPr algn="ctr"/>
+            <a:r>
+              <a:rPr lang="en-US" dirty="0" smtClean="0">
+                <a:latin typeface="Verdana" panose="020B0604030504040204" pitchFamily="34" charset="0"/>
+                <a:ea typeface="Verdana" panose="020B0604030504040204" pitchFamily="34" charset="0"/>
+              </a:rPr>
+              <a:t>Python  Comments : Introduction</a:t>
+            </a:r>
+            <a:endParaRPr lang="en-US" dirty="0">
+              <a:latin typeface="Verdana" panose="020B0604030504040204" pitchFamily="34" charset="0"/>
+              <a:ea typeface="Verdana" panose="020B0604030504040204" pitchFamily="34" charset="0"/>
+            </a:endParaRPr>
+          </a:p>
+        </p:txBody>
+      </p:sp>
+      <p:sp>
+        <p:nvSpPr>
+          <p:cNvPr id="4" name="Content Placeholder 3"/>
+          <p:cNvSpPr>
+            <a:spLocks noGrp="1"/>
+          </p:cNvSpPr>
+          <p:nvPr>
+            <p:ph sz="half" idx="2"/>
+          </p:nvPr>
+        </p:nvSpPr>
+        <p:spPr>
+          <a:xfrm>
+            <a:off x="478972" y="2429691"/>
+            <a:ext cx="11131838" cy="3074126"/>
+          </a:xfrm>
+        </p:spPr>
+        <p:txBody>
+          <a:bodyPr>
+            <a:normAutofit/>
+          </a:bodyPr>
+          <a:lstStyle/>
+          <a:p>
+            <a:r>
+              <a:rPr lang="en-US" dirty="0"/>
+              <a:t>We might wish to take notes of why a section of script functions, for instance</a:t>
+            </a:r>
+            <a:r>
+              <a:rPr lang="en-US" dirty="0" smtClean="0"/>
+              <a:t>.</a:t>
+            </a:r>
+          </a:p>
+          <a:p>
+            <a:r>
+              <a:rPr lang="en-US" dirty="0"/>
+              <a:t>Formulas, procedures, and sophisticated business logic are typically explained with comments. </a:t>
+            </a:r>
+            <a:endParaRPr lang="en-US" dirty="0" smtClean="0"/>
+          </a:p>
+          <a:p>
+            <a:r>
+              <a:rPr lang="en-US" dirty="0" smtClean="0"/>
+              <a:t>Two </a:t>
+            </a:r>
+            <a:r>
+              <a:rPr lang="en-US" dirty="0"/>
+              <a:t>types of comments in </a:t>
+            </a:r>
+            <a:r>
+              <a:rPr lang="en-US" dirty="0" smtClean="0"/>
+              <a:t>Python:</a:t>
+            </a:r>
+          </a:p>
+          <a:p>
+            <a:pPr lvl="1">
+              <a:buFont typeface="Wingdings" panose="05000000000000000000" pitchFamily="2" charset="2"/>
+              <a:buChar char="Ø"/>
+            </a:pPr>
+            <a:r>
+              <a:rPr lang="en-US" dirty="0"/>
+              <a:t>Single-line </a:t>
+            </a:r>
+            <a:r>
+              <a:rPr lang="en-US" dirty="0" smtClean="0"/>
+              <a:t>comments</a:t>
+            </a:r>
+          </a:p>
+          <a:p>
+            <a:pPr lvl="1">
+              <a:buFont typeface="Wingdings" panose="05000000000000000000" pitchFamily="2" charset="2"/>
+              <a:buChar char="Ø"/>
+            </a:pPr>
+            <a:r>
+              <a:rPr lang="en-US" dirty="0"/>
+              <a:t>multi-line </a:t>
+            </a:r>
+            <a:r>
+              <a:rPr lang="en-US" dirty="0" smtClean="0"/>
+              <a:t>comments</a:t>
+            </a:r>
+            <a:endParaRPr lang="en-US" dirty="0"/>
+          </a:p>
+          <a:p>
+            <a:pPr marL="324000" lvl="1" indent="0" algn="ctr">
+              <a:buNone/>
+            </a:pPr>
+            <a:r>
+              <a:rPr lang="en-US" b="1" dirty="0">
+                <a:solidFill>
+                  <a:srgbClr val="0070C0"/>
+                </a:solidFill>
+              </a:rPr>
+              <a:t>&gt;&gt;&gt;&gt;&gt;&gt; Code On the Screen &lt;&lt;&lt;&lt;&lt;&lt;</a:t>
+            </a:r>
+            <a:endParaRPr lang="en-US" dirty="0"/>
+          </a:p>
+          <a:p>
+            <a:pPr marL="324000" lvl="1" indent="0">
+              <a:buNone/>
+            </a:pPr>
+            <a:endParaRPr lang="en-US" dirty="0" smtClean="0"/>
+          </a:p>
+          <a:p>
+            <a:pPr lvl="1"/>
+            <a:endParaRPr lang="en-US" dirty="0" smtClean="0"/>
+          </a:p>
+        </p:txBody>
+      </p:sp>
+    </p:spTree>
+    <p:extLst>
+      <p:ext uri="{BB962C8B-B14F-4D97-AF65-F5344CB8AC3E}">
+        <p14:creationId xmlns:p14="http://schemas.microsoft.com/office/powerpoint/2010/main" val="3786541252"/>
+      </p:ext>
+    </p:extLst>
+  </p:cSld>
+  <p:clrMapOvr>
+    <a:masterClrMapping/>
+  </p:clrMapOvr>
+</p:sld>
+</file>
+
 <file path=ppt/slides/slide2.xml><?xml version="1.0" encoding="utf-8"?>
 <p:sld xmlns:a="http://schemas.openxmlformats.org/drawingml/2006/main" xmlns:r="http://schemas.openxmlformats.org/officeDocument/2006/relationships" xmlns:p="http://schemas.openxmlformats.org/presentationml/2006/main">
   <p:cSld>
@@ -11053,6 +13884,263 @@
     <p:extLst>
       <p:ext uri="{BB962C8B-B14F-4D97-AF65-F5344CB8AC3E}">
         <p14:creationId xmlns:p14="http://schemas.microsoft.com/office/powerpoint/2010/main" val="1703342593"/>
+      </p:ext>
+    </p:extLst>
+  </p:cSld>
+  <p:clrMapOvr>
+    <a:masterClrMapping/>
+  </p:clrMapOvr>
+</p:sld>
+</file>
+
+<file path=ppt/slides/slide20.xml><?xml version="1.0" encoding="utf-8"?>
+<p:sld xmlns:a="http://schemas.openxmlformats.org/drawingml/2006/main" xmlns:r="http://schemas.openxmlformats.org/officeDocument/2006/relationships" xmlns:p="http://schemas.openxmlformats.org/presentationml/2006/main">
+  <p:cSld>
+    <p:bg>
+      <p:bgPr>
+        <a:solidFill>
+          <a:schemeClr val="bg1"/>
+        </a:solidFill>
+        <a:effectLst/>
+      </p:bgPr>
+    </p:bg>
+    <p:spTree>
+      <p:nvGrpSpPr>
+        <p:cNvPr id="1" name=""/>
+        <p:cNvGrpSpPr/>
+        <p:nvPr/>
+      </p:nvGrpSpPr>
+      <p:grpSpPr>
+        <a:xfrm>
+          <a:off x="0" y="0"/>
+          <a:ext cx="0" cy="0"/>
+          <a:chOff x="0" y="0"/>
+          <a:chExt cx="0" cy="0"/>
+        </a:xfrm>
+      </p:grpSpPr>
+      <p:sp>
+        <p:nvSpPr>
+          <p:cNvPr id="2" name="Title 1">
+            <a:extLst>
+              <a:ext uri="{FF2B5EF4-FFF2-40B4-BE49-F238E27FC236}">
+                <a16:creationId xmlns:a16="http://schemas.microsoft.com/office/drawing/2014/main" id="{921633EB-7DCB-4DDC-80AF-C885A3EE1245}"/>
+              </a:ext>
+            </a:extLst>
+          </p:cNvPr>
+          <p:cNvSpPr>
+            <a:spLocks noGrp="1"/>
+          </p:cNvSpPr>
+          <p:nvPr>
+            <p:ph type="title"/>
+          </p:nvPr>
+        </p:nvSpPr>
+        <p:spPr/>
+        <p:txBody>
+          <a:bodyPr>
+            <a:normAutofit/>
+          </a:bodyPr>
+          <a:lstStyle/>
+          <a:p>
+            <a:pPr algn="ctr"/>
+            <a:r>
+              <a:rPr lang="en-US" dirty="0" smtClean="0">
+                <a:latin typeface="Verdana" panose="020B0604030504040204" pitchFamily="34" charset="0"/>
+                <a:ea typeface="Verdana" panose="020B0604030504040204" pitchFamily="34" charset="0"/>
+              </a:rPr>
+              <a:t>Python  Data Input and Output</a:t>
+            </a:r>
+            <a:endParaRPr lang="en-US" dirty="0">
+              <a:latin typeface="Verdana" panose="020B0604030504040204" pitchFamily="34" charset="0"/>
+              <a:ea typeface="Verdana" panose="020B0604030504040204" pitchFamily="34" charset="0"/>
+            </a:endParaRPr>
+          </a:p>
+        </p:txBody>
+      </p:sp>
+      <p:sp>
+        <p:nvSpPr>
+          <p:cNvPr id="4" name="Content Placeholder 3"/>
+          <p:cNvSpPr>
+            <a:spLocks noGrp="1"/>
+          </p:cNvSpPr>
+          <p:nvPr>
+            <p:ph sz="half" idx="2"/>
+          </p:nvPr>
+        </p:nvSpPr>
+        <p:spPr>
+          <a:xfrm>
+            <a:off x="478972" y="2429691"/>
+            <a:ext cx="11131838" cy="3074126"/>
+          </a:xfrm>
+        </p:spPr>
+        <p:txBody>
+          <a:bodyPr>
+            <a:normAutofit/>
+          </a:bodyPr>
+          <a:lstStyle/>
+          <a:p>
+            <a:pPr marL="0" indent="0">
+              <a:buNone/>
+            </a:pPr>
+            <a:endParaRPr lang="en-US" dirty="0"/>
+          </a:p>
+          <a:p>
+            <a:pPr marL="324000" lvl="1" indent="0" algn="ctr">
+              <a:buNone/>
+            </a:pPr>
+            <a:r>
+              <a:rPr lang="en-US" b="1" dirty="0">
+                <a:solidFill>
+                  <a:srgbClr val="0070C0"/>
+                </a:solidFill>
+              </a:rPr>
+              <a:t>&gt;&gt;&gt;&gt;&gt;&gt; Code On the Screen &lt;&lt;&lt;&lt;&lt;&lt;</a:t>
+            </a:r>
+            <a:endParaRPr lang="en-US" dirty="0"/>
+          </a:p>
+          <a:p>
+            <a:pPr marL="324000" lvl="1" indent="0">
+              <a:buNone/>
+            </a:pPr>
+            <a:endParaRPr lang="en-US" dirty="0" smtClean="0"/>
+          </a:p>
+          <a:p>
+            <a:pPr lvl="1"/>
+            <a:endParaRPr lang="en-US" dirty="0" smtClean="0"/>
+          </a:p>
+        </p:txBody>
+      </p:sp>
+    </p:spTree>
+    <p:extLst>
+      <p:ext uri="{BB962C8B-B14F-4D97-AF65-F5344CB8AC3E}">
+        <p14:creationId xmlns:p14="http://schemas.microsoft.com/office/powerpoint/2010/main" val="3059051166"/>
+      </p:ext>
+    </p:extLst>
+  </p:cSld>
+  <p:clrMapOvr>
+    <a:masterClrMapping/>
+  </p:clrMapOvr>
+</p:sld>
+</file>
+
+<file path=ppt/slides/slide21.xml><?xml version="1.0" encoding="utf-8"?>
+<p:sld xmlns:a="http://schemas.openxmlformats.org/drawingml/2006/main" xmlns:r="http://schemas.openxmlformats.org/officeDocument/2006/relationships" xmlns:p="http://schemas.openxmlformats.org/presentationml/2006/main">
+  <p:cSld>
+    <p:spTree>
+      <p:nvGrpSpPr>
+        <p:cNvPr id="1" name=""/>
+        <p:cNvGrpSpPr/>
+        <p:nvPr/>
+      </p:nvGrpSpPr>
+      <p:grpSpPr>
+        <a:xfrm>
+          <a:off x="0" y="0"/>
+          <a:ext cx="0" cy="0"/>
+          <a:chOff x="0" y="0"/>
+          <a:chExt cx="0" cy="0"/>
+        </a:xfrm>
+      </p:grpSpPr>
+      <p:sp>
+        <p:nvSpPr>
+          <p:cNvPr id="2" name="Title 1">
+            <a:extLst>
+              <a:ext uri="{FF2B5EF4-FFF2-40B4-BE49-F238E27FC236}">
+                <a16:creationId xmlns:a16="http://schemas.microsoft.com/office/drawing/2014/main" id="{921633EB-7DCB-4DDC-80AF-C885A3EE1245}"/>
+              </a:ext>
+            </a:extLst>
+          </p:cNvPr>
+          <p:cNvSpPr>
+            <a:spLocks noGrp="1"/>
+          </p:cNvSpPr>
+          <p:nvPr>
+            <p:ph type="title"/>
+          </p:nvPr>
+        </p:nvSpPr>
+        <p:spPr/>
+        <p:txBody>
+          <a:bodyPr>
+            <a:normAutofit/>
+          </a:bodyPr>
+          <a:lstStyle/>
+          <a:p>
+            <a:pPr algn="ctr"/>
+            <a:r>
+              <a:rPr lang="en-US" dirty="0" smtClean="0">
+                <a:latin typeface="Verdana" panose="020B0604030504040204" pitchFamily="34" charset="0"/>
+                <a:ea typeface="Verdana" panose="020B0604030504040204" pitchFamily="34" charset="0"/>
+              </a:rPr>
+              <a:t>Python  </a:t>
+            </a:r>
+            <a:r>
+              <a:rPr lang="en-US" dirty="0" err="1" smtClean="0">
+                <a:latin typeface="Verdana" panose="020B0604030504040204" pitchFamily="34" charset="0"/>
+                <a:ea typeface="Verdana" panose="020B0604030504040204" pitchFamily="34" charset="0"/>
+              </a:rPr>
+              <a:t>TypeCasting</a:t>
+            </a:r>
+            <a:endParaRPr lang="en-US" dirty="0">
+              <a:latin typeface="Verdana" panose="020B0604030504040204" pitchFamily="34" charset="0"/>
+              <a:ea typeface="Verdana" panose="020B0604030504040204" pitchFamily="34" charset="0"/>
+            </a:endParaRPr>
+          </a:p>
+        </p:txBody>
+      </p:sp>
+      <p:sp>
+        <p:nvSpPr>
+          <p:cNvPr id="4" name="Content Placeholder 3"/>
+          <p:cNvSpPr>
+            <a:spLocks noGrp="1"/>
+          </p:cNvSpPr>
+          <p:nvPr>
+            <p:ph sz="half" idx="2"/>
+          </p:nvPr>
+        </p:nvSpPr>
+        <p:spPr>
+          <a:xfrm>
+            <a:off x="478972" y="2429691"/>
+            <a:ext cx="11131838" cy="3074126"/>
+          </a:xfrm>
+        </p:spPr>
+        <p:txBody>
+          <a:bodyPr>
+            <a:normAutofit/>
+          </a:bodyPr>
+          <a:lstStyle/>
+          <a:p>
+            <a:pPr marL="0" indent="0">
+              <a:buNone/>
+            </a:pPr>
+            <a:endParaRPr lang="en-US" dirty="0"/>
+          </a:p>
+          <a:p>
+            <a:pPr marL="324000" lvl="1" indent="0" algn="ctr">
+              <a:buNone/>
+            </a:pPr>
+            <a:r>
+              <a:rPr lang="en-US" b="1" dirty="0">
+                <a:solidFill>
+                  <a:srgbClr val="0070C0"/>
+                </a:solidFill>
+              </a:rPr>
+              <a:t>&gt;&gt;&gt;&gt;&gt;&gt; Code On the Screen &lt;&lt;&lt;&lt;&lt;&lt;</a:t>
+            </a:r>
+            <a:endParaRPr lang="en-US" dirty="0"/>
+          </a:p>
+          <a:p>
+            <a:pPr marL="324000" lvl="1" indent="0">
+              <a:buNone/>
+            </a:pPr>
+            <a:endParaRPr lang="en-US" dirty="0" smtClean="0"/>
+          </a:p>
+          <a:p>
+            <a:pPr lvl="1"/>
+            <a:endParaRPr lang="en-US" dirty="0" smtClean="0"/>
+          </a:p>
+        </p:txBody>
+      </p:sp>
+    </p:spTree>
+    <p:extLst>
+      <p:ext uri="{BB962C8B-B14F-4D97-AF65-F5344CB8AC3E}">
+        <p14:creationId xmlns:p14="http://schemas.microsoft.com/office/powerpoint/2010/main" val="4209415954"/>
       </p:ext>
     </p:extLst>
   </p:cSld>

</xml_diff>

<commit_message>
Modified Slide for class - 2
</commit_message>
<xml_diff>
--- a/Class-02/Class-02.pptx
+++ b/Class-02/Class-02.pptx
@@ -5,10 +5,10 @@
     <p:sldMasterId id="2147483672" r:id="rId4"/>
   </p:sldMasterIdLst>
   <p:notesMasterIdLst>
-    <p:notesMasterId r:id="rId26"/>
+    <p:notesMasterId r:id="rId27"/>
   </p:notesMasterIdLst>
   <p:handoutMasterIdLst>
-    <p:handoutMasterId r:id="rId27"/>
+    <p:handoutMasterId r:id="rId28"/>
   </p:handoutMasterIdLst>
   <p:sldIdLst>
     <p:sldId id="256" r:id="rId5"/>
@@ -32,6 +32,7 @@
     <p:sldId id="277" r:id="rId23"/>
     <p:sldId id="278" r:id="rId24"/>
     <p:sldId id="279" r:id="rId25"/>
+    <p:sldId id="280" r:id="rId26"/>
   </p:sldIdLst>
   <p:sldSz cx="12192000" cy="6858000"/>
   <p:notesSz cx="6858000" cy="9144000"/>
@@ -1100,6 +1101,13 @@
         </dgm:presLayoutVars>
       </dgm:prSet>
       <dgm:spPr/>
+      <dgm:t>
+        <a:bodyPr/>
+        <a:lstStyle/>
+        <a:p>
+          <a:endParaRPr lang="en-US"/>
+        </a:p>
+      </dgm:t>
     </dgm:pt>
     <dgm:pt modelId="{B581B5A0-298F-4E5C-98CA-AEFFA02DA1BB}" type="pres">
       <dgm:prSet presAssocID="{310357E2-A43B-489D-93D4-2790E606FC3F}" presName="node" presStyleLbl="node1" presStyleIdx="0" presStyleCnt="5">
@@ -1108,6 +1116,13 @@
         </dgm:presLayoutVars>
       </dgm:prSet>
       <dgm:spPr/>
+      <dgm:t>
+        <a:bodyPr/>
+        <a:lstStyle/>
+        <a:p>
+          <a:endParaRPr lang="en-US"/>
+        </a:p>
+      </dgm:t>
     </dgm:pt>
     <dgm:pt modelId="{E7B34C81-C891-4161-8A02-BF26CB71AA46}" type="pres">
       <dgm:prSet presAssocID="{310357E2-A43B-489D-93D4-2790E606FC3F}" presName="spNode" presStyleCnt="0"/>
@@ -1116,6 +1131,13 @@
     <dgm:pt modelId="{FFBA27D0-4D99-461B-9156-7A0D100B81DC}" type="pres">
       <dgm:prSet presAssocID="{C8958CE5-B654-4705-88D1-17D40D5F11B5}" presName="sibTrans" presStyleLbl="sibTrans1D1" presStyleIdx="0" presStyleCnt="5"/>
       <dgm:spPr/>
+      <dgm:t>
+        <a:bodyPr/>
+        <a:lstStyle/>
+        <a:p>
+          <a:endParaRPr lang="en-US"/>
+        </a:p>
+      </dgm:t>
     </dgm:pt>
     <dgm:pt modelId="{1BD45E3C-FF2E-43D9-A65B-C86617A412A2}" type="pres">
       <dgm:prSet presAssocID="{A5A84E84-27A5-4D79-AC81-45B3B512FF80}" presName="node" presStyleLbl="node1" presStyleIdx="1" presStyleCnt="5">
@@ -1124,6 +1146,13 @@
         </dgm:presLayoutVars>
       </dgm:prSet>
       <dgm:spPr/>
+      <dgm:t>
+        <a:bodyPr/>
+        <a:lstStyle/>
+        <a:p>
+          <a:endParaRPr lang="en-US"/>
+        </a:p>
+      </dgm:t>
     </dgm:pt>
     <dgm:pt modelId="{1E64ECEE-51AF-4DBF-AE42-E4AFA8EA441A}" type="pres">
       <dgm:prSet presAssocID="{A5A84E84-27A5-4D79-AC81-45B3B512FF80}" presName="spNode" presStyleCnt="0"/>
@@ -1132,6 +1161,13 @@
     <dgm:pt modelId="{32065591-9666-4541-800A-BCF653B57113}" type="pres">
       <dgm:prSet presAssocID="{89A2EC9D-6713-43B7-8EA8-19942F6A716B}" presName="sibTrans" presStyleLbl="sibTrans1D1" presStyleIdx="1" presStyleCnt="5"/>
       <dgm:spPr/>
+      <dgm:t>
+        <a:bodyPr/>
+        <a:lstStyle/>
+        <a:p>
+          <a:endParaRPr lang="en-US"/>
+        </a:p>
+      </dgm:t>
     </dgm:pt>
     <dgm:pt modelId="{6B0782D7-1EC2-4DB6-A641-7597CA092DD5}" type="pres">
       <dgm:prSet presAssocID="{28273085-0C92-40E4-B92E-57B65E2F6540}" presName="node" presStyleLbl="node1" presStyleIdx="2" presStyleCnt="5">
@@ -1140,6 +1176,13 @@
         </dgm:presLayoutVars>
       </dgm:prSet>
       <dgm:spPr/>
+      <dgm:t>
+        <a:bodyPr/>
+        <a:lstStyle/>
+        <a:p>
+          <a:endParaRPr lang="en-US"/>
+        </a:p>
+      </dgm:t>
     </dgm:pt>
     <dgm:pt modelId="{58A9BC57-F369-4907-B970-013C4350A446}" type="pres">
       <dgm:prSet presAssocID="{28273085-0C92-40E4-B92E-57B65E2F6540}" presName="spNode" presStyleCnt="0"/>
@@ -1148,6 +1191,13 @@
     <dgm:pt modelId="{7856F141-0154-4B49-8911-D3EDD85DC06E}" type="pres">
       <dgm:prSet presAssocID="{3A50C854-D829-4314-9546-A01B30BB30F9}" presName="sibTrans" presStyleLbl="sibTrans1D1" presStyleIdx="2" presStyleCnt="5"/>
       <dgm:spPr/>
+      <dgm:t>
+        <a:bodyPr/>
+        <a:lstStyle/>
+        <a:p>
+          <a:endParaRPr lang="en-US"/>
+        </a:p>
+      </dgm:t>
     </dgm:pt>
     <dgm:pt modelId="{31DBDBA3-56D2-4DEA-932C-F4D5C032ACD0}" type="pres">
       <dgm:prSet presAssocID="{E0005D2F-ADDE-4094-B4E9-173CFDCC92FB}" presName="node" presStyleLbl="node1" presStyleIdx="3" presStyleCnt="5">
@@ -1156,6 +1206,13 @@
         </dgm:presLayoutVars>
       </dgm:prSet>
       <dgm:spPr/>
+      <dgm:t>
+        <a:bodyPr/>
+        <a:lstStyle/>
+        <a:p>
+          <a:endParaRPr lang="en-US"/>
+        </a:p>
+      </dgm:t>
     </dgm:pt>
     <dgm:pt modelId="{DC170B9E-75A5-4464-A9F0-103A913B8D2E}" type="pres">
       <dgm:prSet presAssocID="{E0005D2F-ADDE-4094-B4E9-173CFDCC92FB}" presName="spNode" presStyleCnt="0"/>
@@ -1164,6 +1221,13 @@
     <dgm:pt modelId="{53C1A235-D08B-46E5-8FD5-01FD6D8A3376}" type="pres">
       <dgm:prSet presAssocID="{1A34FC20-77EF-4E4D-A43B-278D4A9D26B4}" presName="sibTrans" presStyleLbl="sibTrans1D1" presStyleIdx="3" presStyleCnt="5"/>
       <dgm:spPr/>
+      <dgm:t>
+        <a:bodyPr/>
+        <a:lstStyle/>
+        <a:p>
+          <a:endParaRPr lang="en-US"/>
+        </a:p>
+      </dgm:t>
     </dgm:pt>
     <dgm:pt modelId="{871DF0F4-F755-4268-96F3-BB1F8E893332}" type="pres">
       <dgm:prSet presAssocID="{32A27B6C-AA6C-430F-BA8E-2C84D78C092D}" presName="node" presStyleLbl="node1" presStyleIdx="4" presStyleCnt="5">
@@ -1172,6 +1236,13 @@
         </dgm:presLayoutVars>
       </dgm:prSet>
       <dgm:spPr/>
+      <dgm:t>
+        <a:bodyPr/>
+        <a:lstStyle/>
+        <a:p>
+          <a:endParaRPr lang="en-US"/>
+        </a:p>
+      </dgm:t>
     </dgm:pt>
     <dgm:pt modelId="{5C70352F-FF49-40BE-9D83-224BC1C3A599}" type="pres">
       <dgm:prSet presAssocID="{32A27B6C-AA6C-430F-BA8E-2C84D78C092D}" presName="spNode" presStyleCnt="0"/>
@@ -1180,25 +1251,32 @@
     <dgm:pt modelId="{53D260ED-60C1-4793-8699-8F11D727C876}" type="pres">
       <dgm:prSet presAssocID="{D1B8106B-B5AA-46C0-A62E-5D807E66DADC}" presName="sibTrans" presStyleLbl="sibTrans1D1" presStyleIdx="4" presStyleCnt="5"/>
       <dgm:spPr/>
+      <dgm:t>
+        <a:bodyPr/>
+        <a:lstStyle/>
+        <a:p>
+          <a:endParaRPr lang="en-US"/>
+        </a:p>
+      </dgm:t>
     </dgm:pt>
   </dgm:ptLst>
   <dgm:cxnLst>
+    <dgm:cxn modelId="{5B57CF2E-5BB9-4D7C-95CC-57027B5487DC}" srcId="{79576218-2D43-436A-8B7F-B21AF4625892}" destId="{A5A84E84-27A5-4D79-AC81-45B3B512FF80}" srcOrd="1" destOrd="0" parTransId="{BE2EF500-D544-4BB1-B0CB-22B1CBD5044E}" sibTransId="{89A2EC9D-6713-43B7-8EA8-19942F6A716B}"/>
+    <dgm:cxn modelId="{4FF130B9-0909-48C7-A6AA-89A311BD5C7D}" type="presOf" srcId="{310357E2-A43B-489D-93D4-2790E606FC3F}" destId="{B581B5A0-298F-4E5C-98CA-AEFFA02DA1BB}" srcOrd="0" destOrd="0" presId="urn:microsoft.com/office/officeart/2005/8/layout/cycle6"/>
+    <dgm:cxn modelId="{847C0183-4668-4091-9B9C-64E7AA175A82}" type="presOf" srcId="{32A27B6C-AA6C-430F-BA8E-2C84D78C092D}" destId="{871DF0F4-F755-4268-96F3-BB1F8E893332}" srcOrd="0" destOrd="0" presId="urn:microsoft.com/office/officeart/2005/8/layout/cycle6"/>
     <dgm:cxn modelId="{AAE415C0-8B47-4677-952E-277ECBEC6725}" srcId="{79576218-2D43-436A-8B7F-B21AF4625892}" destId="{28273085-0C92-40E4-B92E-57B65E2F6540}" srcOrd="2" destOrd="0" parTransId="{A90508B7-6175-41A0-91B6-8C408A406681}" sibTransId="{3A50C854-D829-4314-9546-A01B30BB30F9}"/>
-    <dgm:cxn modelId="{BD8D6A02-00E9-42AD-BDA3-CF7F4BEEAFBB}" type="presOf" srcId="{79576218-2D43-436A-8B7F-B21AF4625892}" destId="{10EF3DD9-496C-4499-A80F-71B287122D08}" srcOrd="0" destOrd="0" presId="urn:microsoft.com/office/officeart/2005/8/layout/cycle6"/>
+    <dgm:cxn modelId="{153F186B-A4CE-4A8D-9A6F-2480BBBBDB10}" type="presOf" srcId="{3A50C854-D829-4314-9546-A01B30BB30F9}" destId="{7856F141-0154-4B49-8911-D3EDD85DC06E}" srcOrd="0" destOrd="0" presId="urn:microsoft.com/office/officeart/2005/8/layout/cycle6"/>
+    <dgm:cxn modelId="{01772B22-3956-4DE5-BE75-432113D17008}" type="presOf" srcId="{C8958CE5-B654-4705-88D1-17D40D5F11B5}" destId="{FFBA27D0-4D99-461B-9156-7A0D100B81DC}" srcOrd="0" destOrd="0" presId="urn:microsoft.com/office/officeart/2005/8/layout/cycle6"/>
     <dgm:cxn modelId="{FC32B923-DA17-43F0-923A-5DE6E4A5CD52}" srcId="{79576218-2D43-436A-8B7F-B21AF4625892}" destId="{310357E2-A43B-489D-93D4-2790E606FC3F}" srcOrd="0" destOrd="0" parTransId="{AF6D4102-AD24-4E92-A9EB-B60FF325D30D}" sibTransId="{C8958CE5-B654-4705-88D1-17D40D5F11B5}"/>
-    <dgm:cxn modelId="{1C42A70D-8344-4DD4-9752-67EF8CEE2341}" type="presOf" srcId="{D1B8106B-B5AA-46C0-A62E-5D807E66DADC}" destId="{53D260ED-60C1-4793-8699-8F11D727C876}" srcOrd="0" destOrd="0" presId="urn:microsoft.com/office/officeart/2005/8/layout/cycle6"/>
-    <dgm:cxn modelId="{01772B22-3956-4DE5-BE75-432113D17008}" type="presOf" srcId="{C8958CE5-B654-4705-88D1-17D40D5F11B5}" destId="{FFBA27D0-4D99-461B-9156-7A0D100B81DC}" srcOrd="0" destOrd="0" presId="urn:microsoft.com/office/officeart/2005/8/layout/cycle6"/>
     <dgm:cxn modelId="{B318E0D0-4EF7-4C60-AFE8-9C0D36B221FD}" type="presOf" srcId="{28273085-0C92-40E4-B92E-57B65E2F6540}" destId="{6B0782D7-1EC2-4DB6-A641-7597CA092DD5}" srcOrd="0" destOrd="0" presId="urn:microsoft.com/office/officeart/2005/8/layout/cycle6"/>
-    <dgm:cxn modelId="{5B57CF2E-5BB9-4D7C-95CC-57027B5487DC}" srcId="{79576218-2D43-436A-8B7F-B21AF4625892}" destId="{A5A84E84-27A5-4D79-AC81-45B3B512FF80}" srcOrd="1" destOrd="0" parTransId="{BE2EF500-D544-4BB1-B0CB-22B1CBD5044E}" sibTransId="{89A2EC9D-6713-43B7-8EA8-19942F6A716B}"/>
-    <dgm:cxn modelId="{153F186B-A4CE-4A8D-9A6F-2480BBBBDB10}" type="presOf" srcId="{3A50C854-D829-4314-9546-A01B30BB30F9}" destId="{7856F141-0154-4B49-8911-D3EDD85DC06E}" srcOrd="0" destOrd="0" presId="urn:microsoft.com/office/officeart/2005/8/layout/cycle6"/>
-    <dgm:cxn modelId="{D54479DB-E846-44BB-B6A6-70B8FEA835A3}" type="presOf" srcId="{E0005D2F-ADDE-4094-B4E9-173CFDCC92FB}" destId="{31DBDBA3-56D2-4DEA-932C-F4D5C032ACD0}" srcOrd="0" destOrd="0" presId="urn:microsoft.com/office/officeart/2005/8/layout/cycle6"/>
-    <dgm:cxn modelId="{847C0183-4668-4091-9B9C-64E7AA175A82}" type="presOf" srcId="{32A27B6C-AA6C-430F-BA8E-2C84D78C092D}" destId="{871DF0F4-F755-4268-96F3-BB1F8E893332}" srcOrd="0" destOrd="0" presId="urn:microsoft.com/office/officeart/2005/8/layout/cycle6"/>
-    <dgm:cxn modelId="{4FF130B9-0909-48C7-A6AA-89A311BD5C7D}" type="presOf" srcId="{310357E2-A43B-489D-93D4-2790E606FC3F}" destId="{B581B5A0-298F-4E5C-98CA-AEFFA02DA1BB}" srcOrd="0" destOrd="0" presId="urn:microsoft.com/office/officeart/2005/8/layout/cycle6"/>
-    <dgm:cxn modelId="{35A3892D-B75B-4C31-A000-E45726C2018A}" type="presOf" srcId="{1A34FC20-77EF-4E4D-A43B-278D4A9D26B4}" destId="{53C1A235-D08B-46E5-8FD5-01FD6D8A3376}" srcOrd="0" destOrd="0" presId="urn:microsoft.com/office/officeart/2005/8/layout/cycle6"/>
-    <dgm:cxn modelId="{7D225103-E872-4B01-82CB-05B518C2DC4C}" srcId="{79576218-2D43-436A-8B7F-B21AF4625892}" destId="{32A27B6C-AA6C-430F-BA8E-2C84D78C092D}" srcOrd="4" destOrd="0" parTransId="{665FE793-58D7-4AB2-AFCE-BBE3E65502AA}" sibTransId="{D1B8106B-B5AA-46C0-A62E-5D807E66DADC}"/>
-    <dgm:cxn modelId="{D0B00AE7-BB44-43EA-8E9E-B4BC398751DD}" srcId="{79576218-2D43-436A-8B7F-B21AF4625892}" destId="{E0005D2F-ADDE-4094-B4E9-173CFDCC92FB}" srcOrd="3" destOrd="0" parTransId="{8DC0B8FB-5911-4616-A825-C4DD971364F2}" sibTransId="{1A34FC20-77EF-4E4D-A43B-278D4A9D26B4}"/>
     <dgm:cxn modelId="{DEF55A9F-5642-43C0-B07C-435C8EED9248}" type="presOf" srcId="{89A2EC9D-6713-43B7-8EA8-19942F6A716B}" destId="{32065591-9666-4541-800A-BCF653B57113}" srcOrd="0" destOrd="0" presId="urn:microsoft.com/office/officeart/2005/8/layout/cycle6"/>
     <dgm:cxn modelId="{74B8147C-0FA9-43A7-86A8-8EF02B201AF0}" type="presOf" srcId="{A5A84E84-27A5-4D79-AC81-45B3B512FF80}" destId="{1BD45E3C-FF2E-43D9-A65B-C86617A412A2}" srcOrd="0" destOrd="0" presId="urn:microsoft.com/office/officeart/2005/8/layout/cycle6"/>
+    <dgm:cxn modelId="{1C42A70D-8344-4DD4-9752-67EF8CEE2341}" type="presOf" srcId="{D1B8106B-B5AA-46C0-A62E-5D807E66DADC}" destId="{53D260ED-60C1-4793-8699-8F11D727C876}" srcOrd="0" destOrd="0" presId="urn:microsoft.com/office/officeart/2005/8/layout/cycle6"/>
+    <dgm:cxn modelId="{D0B00AE7-BB44-43EA-8E9E-B4BC398751DD}" srcId="{79576218-2D43-436A-8B7F-B21AF4625892}" destId="{E0005D2F-ADDE-4094-B4E9-173CFDCC92FB}" srcOrd="3" destOrd="0" parTransId="{8DC0B8FB-5911-4616-A825-C4DD971364F2}" sibTransId="{1A34FC20-77EF-4E4D-A43B-278D4A9D26B4}"/>
+    <dgm:cxn modelId="{35A3892D-B75B-4C31-A000-E45726C2018A}" type="presOf" srcId="{1A34FC20-77EF-4E4D-A43B-278D4A9D26B4}" destId="{53C1A235-D08B-46E5-8FD5-01FD6D8A3376}" srcOrd="0" destOrd="0" presId="urn:microsoft.com/office/officeart/2005/8/layout/cycle6"/>
+    <dgm:cxn modelId="{D54479DB-E846-44BB-B6A6-70B8FEA835A3}" type="presOf" srcId="{E0005D2F-ADDE-4094-B4E9-173CFDCC92FB}" destId="{31DBDBA3-56D2-4DEA-932C-F4D5C032ACD0}" srcOrd="0" destOrd="0" presId="urn:microsoft.com/office/officeart/2005/8/layout/cycle6"/>
+    <dgm:cxn modelId="{BD8D6A02-00E9-42AD-BDA3-CF7F4BEEAFBB}" type="presOf" srcId="{79576218-2D43-436A-8B7F-B21AF4625892}" destId="{10EF3DD9-496C-4499-A80F-71B287122D08}" srcOrd="0" destOrd="0" presId="urn:microsoft.com/office/officeart/2005/8/layout/cycle6"/>
+    <dgm:cxn modelId="{7D225103-E872-4B01-82CB-05B518C2DC4C}" srcId="{79576218-2D43-436A-8B7F-B21AF4625892}" destId="{32A27B6C-AA6C-430F-BA8E-2C84D78C092D}" srcOrd="4" destOrd="0" parTransId="{665FE793-58D7-4AB2-AFCE-BBE3E65502AA}" sibTransId="{D1B8106B-B5AA-46C0-A62E-5D807E66DADC}"/>
     <dgm:cxn modelId="{34E6780A-869E-4185-A547-1DEBAA2D33E6}" type="presParOf" srcId="{10EF3DD9-496C-4499-A80F-71B287122D08}" destId="{B581B5A0-298F-4E5C-98CA-AEFFA02DA1BB}" srcOrd="0" destOrd="0" presId="urn:microsoft.com/office/officeart/2005/8/layout/cycle6"/>
     <dgm:cxn modelId="{6FDA2DE5-1800-4DE8-87C0-E813D8EFAC77}" type="presParOf" srcId="{10EF3DD9-496C-4499-A80F-71B287122D08}" destId="{E7B34C81-C891-4161-8A02-BF26CB71AA46}" srcOrd="1" destOrd="0" presId="urn:microsoft.com/office/officeart/2005/8/layout/cycle6"/>
     <dgm:cxn modelId="{5AA6E0BA-051A-4355-9363-F4646C095636}" type="presParOf" srcId="{10EF3DD9-496C-4499-A80F-71B287122D08}" destId="{FFBA27D0-4D99-461B-9156-7A0D100B81DC}" srcOrd="2" destOrd="0" presId="urn:microsoft.com/office/officeart/2005/8/layout/cycle6"/>
@@ -3610,7 +3688,7 @@
           <a:p>
             <a:fld id="{4929A4FD-FAFB-4CDA-9DC5-D20CA18269A9}" type="datetimeFigureOut">
               <a:rPr lang="en-US" smtClean="0"/>
-              <a:t>8/25/2022</a:t>
+              <a:t>8/27/2022</a:t>
             </a:fld>
             <a:endParaRPr lang="en-US" dirty="0"/>
           </a:p>
@@ -3787,7 +3865,7 @@
           <a:p>
             <a:fld id="{CB91E35E-F34C-4F0E-B8A1-D9F5F49CB3AD}" type="datetimeFigureOut">
               <a:rPr lang="en-US" smtClean="0"/>
-              <a:t>8/25/2022</a:t>
+              <a:t>8/27/2022</a:t>
             </a:fld>
             <a:endParaRPr lang="en-US" dirty="0"/>
           </a:p>
@@ -6064,7 +6142,7 @@
             <a:fld id="{B61BEF0D-F0BB-DE4B-95CE-6DB70DBA9567}" type="datetimeFigureOut">
               <a:rPr lang="en-US" smtClean="0"/>
               <a:pPr/>
-              <a:t>8/25/2022</a:t>
+              <a:t>8/27/2022</a:t>
             </a:fld>
             <a:endParaRPr lang="en-US" dirty="0"/>
           </a:p>
@@ -6328,7 +6406,7 @@
             <a:fld id="{B61BEF0D-F0BB-DE4B-95CE-6DB70DBA9567}" type="datetimeFigureOut">
               <a:rPr lang="en-US" smtClean="0"/>
               <a:pPr/>
-              <a:t>8/25/2022</a:t>
+              <a:t>8/27/2022</a:t>
             </a:fld>
             <a:endParaRPr lang="en-US" dirty="0"/>
           </a:p>
@@ -6565,7 +6643,7 @@
             <a:fld id="{B61BEF0D-F0BB-DE4B-95CE-6DB70DBA9567}" type="datetimeFigureOut">
               <a:rPr lang="en-US" smtClean="0"/>
               <a:pPr/>
-              <a:t>8/25/2022</a:t>
+              <a:t>8/27/2022</a:t>
             </a:fld>
             <a:endParaRPr lang="en-US" dirty="0"/>
           </a:p>
@@ -6807,7 +6885,7 @@
             <a:fld id="{B61BEF0D-F0BB-DE4B-95CE-6DB70DBA9567}" type="datetimeFigureOut">
               <a:rPr lang="en-US" smtClean="0"/>
               <a:pPr/>
-              <a:t>8/25/2022</a:t>
+              <a:t>8/27/2022</a:t>
             </a:fld>
             <a:endParaRPr lang="en-US" dirty="0"/>
           </a:p>
@@ -7116,7 +7194,7 @@
             <a:fld id="{B61BEF0D-F0BB-DE4B-95CE-6DB70DBA9567}" type="datetimeFigureOut">
               <a:rPr lang="en-US" smtClean="0"/>
               <a:pPr/>
-              <a:t>8/25/2022</a:t>
+              <a:t>8/27/2022</a:t>
             </a:fld>
             <a:endParaRPr lang="en-US" dirty="0"/>
           </a:p>
@@ -7420,7 +7498,7 @@
             <a:fld id="{B61BEF0D-F0BB-DE4B-95CE-6DB70DBA9567}" type="datetimeFigureOut">
               <a:rPr lang="en-US" smtClean="0"/>
               <a:pPr/>
-              <a:t>8/25/2022</a:t>
+              <a:t>8/27/2022</a:t>
             </a:fld>
             <a:endParaRPr lang="en-US" dirty="0"/>
           </a:p>
@@ -7844,7 +7922,7 @@
             <a:fld id="{B61BEF0D-F0BB-DE4B-95CE-6DB70DBA9567}" type="datetimeFigureOut">
               <a:rPr lang="en-US" smtClean="0"/>
               <a:pPr/>
-              <a:t>8/25/2022</a:t>
+              <a:t>8/27/2022</a:t>
             </a:fld>
             <a:endParaRPr lang="en-US" dirty="0"/>
           </a:p>
@@ -7941,7 +8019,7 @@
             <a:fld id="{B61BEF0D-F0BB-DE4B-95CE-6DB70DBA9567}" type="datetimeFigureOut">
               <a:rPr lang="en-US" smtClean="0"/>
               <a:pPr/>
-              <a:t>8/25/2022</a:t>
+              <a:t>8/27/2022</a:t>
             </a:fld>
             <a:endParaRPr lang="en-US" dirty="0"/>
           </a:p>
@@ -8105,7 +8183,7 @@
             <a:fld id="{B61BEF0D-F0BB-DE4B-95CE-6DB70DBA9567}" type="datetimeFigureOut">
               <a:rPr lang="en-US" smtClean="0"/>
               <a:pPr/>
-              <a:t>8/25/2022</a:t>
+              <a:t>8/27/2022</a:t>
             </a:fld>
             <a:endParaRPr lang="en-US" dirty="0"/>
           </a:p>
@@ -8485,7 +8563,7 @@
             <a:fld id="{B61BEF0D-F0BB-DE4B-95CE-6DB70DBA9567}" type="datetimeFigureOut">
               <a:rPr lang="en-US" smtClean="0"/>
               <a:pPr/>
-              <a:t>8/25/2022</a:t>
+              <a:t>8/27/2022</a:t>
             </a:fld>
             <a:endParaRPr lang="en-US" dirty="0"/>
           </a:p>
@@ -8776,7 +8854,7 @@
             <a:fld id="{B61BEF0D-F0BB-DE4B-95CE-6DB70DBA9567}" type="datetimeFigureOut">
               <a:rPr lang="en-US" smtClean="0"/>
               <a:pPr/>
-              <a:t>8/25/2022</a:t>
+              <a:t>8/27/2022</a:t>
             </a:fld>
             <a:endParaRPr lang="en-US" dirty="0"/>
           </a:p>
@@ -8989,7 +9067,7 @@
             <a:fld id="{B61BEF0D-F0BB-DE4B-95CE-6DB70DBA9567}" type="datetimeFigureOut">
               <a:rPr lang="en-US" smtClean="0"/>
               <a:pPr/>
-              <a:t>8/25/2022</a:t>
+              <a:t>8/27/2022</a:t>
             </a:fld>
             <a:endParaRPr lang="en-US" dirty="0"/>
           </a:p>
@@ -9607,7 +9685,7 @@
                 <a16:creationId xmlns:a16="http://schemas.microsoft.com/office/drawing/2014/main" id="{493D4EDA-58E0-40CC-B3CA-14CDEB349D24}"/>
               </a:ext>
               <a:ext uri="{C183D7F6-B498-43B3-948B-1728B52AA6E4}">
-                <adec:decorative xmlns:adec="http://schemas.microsoft.com/office/drawing/2017/decorative" xmlns="" val="1"/>
+                <adec:decorative xmlns="" xmlns:adec="http://schemas.microsoft.com/office/drawing/2017/decorative" val="1"/>
               </a:ext>
             </a:extLst>
           </p:cNvPr>
@@ -9702,7 +9780,7 @@
                 <a16:creationId xmlns:a16="http://schemas.microsoft.com/office/drawing/2014/main" id="{AA9EB0BC-A85E-4C26-B355-5DFCEF6CCB49}"/>
               </a:ext>
               <a:ext uri="{C183D7F6-B498-43B3-948B-1728B52AA6E4}">
-                <adec:decorative xmlns:adec="http://schemas.microsoft.com/office/drawing/2017/decorative" xmlns="" val="1"/>
+                <adec:decorative xmlns="" xmlns:adec="http://schemas.microsoft.com/office/drawing/2017/decorative" val="1"/>
               </a:ext>
             </a:extLst>
           </p:cNvPr>
@@ -9733,7 +9811,7 @@
                   <a16:creationId xmlns:a16="http://schemas.microsoft.com/office/drawing/2014/main" id="{3643E56B-BD42-413D-B17D-7958270F5DE4}"/>
                 </a:ext>
                 <a:ext uri="{C183D7F6-B498-43B3-948B-1728B52AA6E4}">
-                  <adec:decorative xmlns:adec="http://schemas.microsoft.com/office/drawing/2017/decorative" xmlns="" val="1"/>
+                  <adec:decorative xmlns="" xmlns:adec="http://schemas.microsoft.com/office/drawing/2017/decorative" val="1"/>
                 </a:ext>
               </a:extLst>
             </p:cNvPr>
@@ -9785,7 +9863,7 @@
                   <a16:creationId xmlns:a16="http://schemas.microsoft.com/office/drawing/2014/main" id="{96C04F74-9467-4FA5-95DC-8D481A29740E}"/>
                 </a:ext>
                 <a:ext uri="{C183D7F6-B498-43B3-948B-1728B52AA6E4}">
-                  <adec:decorative xmlns:adec="http://schemas.microsoft.com/office/drawing/2017/decorative" xmlns="" val="1"/>
+                  <adec:decorative xmlns="" xmlns:adec="http://schemas.microsoft.com/office/drawing/2017/decorative" val="1"/>
                 </a:ext>
               </a:extLst>
             </p:cNvPr>
@@ -9837,7 +9915,7 @@
                   <a16:creationId xmlns:a16="http://schemas.microsoft.com/office/drawing/2014/main" id="{D73DE1C3-5C37-42E9-A3F0-256F1938327C}"/>
                 </a:ext>
                 <a:ext uri="{C183D7F6-B498-43B3-948B-1728B52AA6E4}">
-                  <adec:decorative xmlns:adec="http://schemas.microsoft.com/office/drawing/2017/decorative" xmlns="" val="1"/>
+                  <adec:decorative xmlns="" xmlns:adec="http://schemas.microsoft.com/office/drawing/2017/decorative" val="1"/>
                 </a:ext>
               </a:extLst>
             </p:cNvPr>
@@ -9890,7 +9968,7 @@
                 <a16:creationId xmlns:a16="http://schemas.microsoft.com/office/drawing/2014/main" id="{4A2E7EC3-E07C-46CE-9B25-41865A50681C}"/>
               </a:ext>
               <a:ext uri="{C183D7F6-B498-43B3-948B-1728B52AA6E4}">
-                <adec:decorative xmlns:adec="http://schemas.microsoft.com/office/drawing/2017/decorative" xmlns="" val="1"/>
+                <adec:decorative xmlns="" xmlns:adec="http://schemas.microsoft.com/office/drawing/2017/decorative" val="1"/>
               </a:ext>
             </a:extLst>
           </p:cNvPr>
@@ -10104,65 +10182,49 @@
           </a:p>
         </p:txBody>
       </p:sp>
-      <p:sp>
-        <p:nvSpPr>
-          <p:cNvPr id="4" name="Content Placeholder 3"/>
-          <p:cNvSpPr>
-            <a:spLocks noGrp="1"/>
-          </p:cNvSpPr>
+      <p:pic>
+        <p:nvPicPr>
+          <p:cNvPr id="5" name="Picture 2" descr="https://memegenerator.net/img/instances/61907223/talk-is-cheap-show-me-the-code.jpg"/>
+          <p:cNvPicPr>
+            <a:picLocks noGrp="1" noChangeAspect="1" noChangeArrowheads="1"/>
+          </p:cNvPicPr>
           <p:nvPr>
             <p:ph sz="half" idx="2"/>
           </p:nvPr>
-        </p:nvSpPr>
-        <p:spPr>
+        </p:nvPicPr>
+        <p:blipFill>
+          <a:blip r:embed="rId3">
+            <a:extLst>
+              <a:ext uri="{28A0092B-C50C-407E-A947-70E740481C1C}">
+                <a14:useLocalDpi xmlns:a14="http://schemas.microsoft.com/office/drawing/2010/main" val="0"/>
+              </a:ext>
+            </a:extLst>
+          </a:blip>
+          <a:srcRect/>
+          <a:stretch>
+            <a:fillRect/>
+          </a:stretch>
+        </p:blipFill>
+        <p:spPr bwMode="auto">
           <a:xfrm>
-            <a:off x="478972" y="2429691"/>
-            <a:ext cx="11131838" cy="3431359"/>
+            <a:off x="2403566" y="2430463"/>
+            <a:ext cx="7106193" cy="3430587"/>
           </a:xfrm>
+          <a:prstGeom prst="rect">
+            <a:avLst/>
+          </a:prstGeom>
+          <a:noFill/>
+          <a:extLst>
+            <a:ext uri="{909E8E84-426E-40DD-AFC4-6F175D3DCCD1}">
+              <a14:hiddenFill xmlns:a14="http://schemas.microsoft.com/office/drawing/2010/main">
+                <a:solidFill>
+                  <a:srgbClr val="FFFFFF"/>
+                </a:solidFill>
+              </a14:hiddenFill>
+            </a:ext>
+          </a:extLst>
         </p:spPr>
-        <p:txBody>
-          <a:bodyPr>
-            <a:normAutofit/>
-          </a:bodyPr>
-          <a:lstStyle/>
-          <a:p>
-            <a:pPr marL="0" indent="0" algn="ctr">
-              <a:buNone/>
-            </a:pPr>
-            <a:r>
-              <a:rPr lang="en-US" b="1" dirty="0" smtClean="0">
-                <a:solidFill>
-                  <a:srgbClr val="0070C0"/>
-                </a:solidFill>
-              </a:rPr>
-              <a:t>&gt;&gt;&gt;&gt;&gt;&gt; Code On the Screen &lt;&lt;&lt;&lt;&lt;&lt;</a:t>
-            </a:r>
-            <a:r>
-              <a:rPr lang="en-US" b="1" dirty="0">
-                <a:solidFill>
-                  <a:srgbClr val="0070C0"/>
-                </a:solidFill>
-              </a:rPr>
-              <a:t/>
-            </a:r>
-            <a:br>
-              <a:rPr lang="en-US" b="1" dirty="0">
-                <a:solidFill>
-                  <a:srgbClr val="0070C0"/>
-                </a:solidFill>
-              </a:rPr>
-            </a:br>
-            <a:endParaRPr lang="en-US" b="1" dirty="0" smtClean="0">
-              <a:solidFill>
-                <a:srgbClr val="0070C0"/>
-              </a:solidFill>
-            </a:endParaRPr>
-          </a:p>
-          <a:p>
-            <a:endParaRPr lang="en-US" dirty="0"/>
-          </a:p>
-        </p:txBody>
-      </p:sp>
+      </p:pic>
     </p:spTree>
     <p:extLst>
       <p:ext uri="{BB962C8B-B14F-4D97-AF65-F5344CB8AC3E}">
@@ -10446,7 +10508,6 @@
               <a:rPr lang="en-US" dirty="0"/>
               <a:t>The interpreter implicitly binds the value with its type.</a:t>
             </a:r>
-            <a:endParaRPr lang="en-US" dirty="0"/>
           </a:p>
         </p:txBody>
       </p:sp>
@@ -11142,7 +11203,6 @@
               <a:rPr lang="en-US" dirty="0"/>
               <a:t> or a sequence of elements is passed in the curly braces and separated by the comma.</a:t>
             </a:r>
-            <a:endParaRPr lang="en-US" dirty="0"/>
           </a:p>
         </p:txBody>
       </p:sp>
@@ -11227,7 +11287,7 @@
         <p:spPr>
           <a:xfrm>
             <a:off x="478972" y="2429691"/>
-            <a:ext cx="11131838" cy="3431359"/>
+            <a:ext cx="11131838" cy="862149"/>
           </a:xfrm>
         </p:spPr>
         <p:txBody>
@@ -11264,24 +11324,56 @@
             <a:endParaRPr lang="en-US" dirty="0"/>
           </a:p>
           <a:p>
-            <a:pPr marL="0" indent="0" algn="ctr">
+            <a:pPr marL="0" indent="0">
               <a:buNone/>
             </a:pPr>
-            <a:r>
-              <a:rPr lang="en-US" b="1" dirty="0">
+            <a:endParaRPr lang="en-US" dirty="0" smtClean="0"/>
+          </a:p>
+        </p:txBody>
+      </p:sp>
+      <p:pic>
+        <p:nvPicPr>
+          <p:cNvPr id="5" name="Picture 2" descr="https://memegenerator.net/img/instances/61907223/talk-is-cheap-show-me-the-code.jpg"/>
+          <p:cNvPicPr>
+            <a:picLocks noGrp="1" noChangeAspect="1" noChangeArrowheads="1"/>
+          </p:cNvPicPr>
+          <p:nvPr>
+            <p:ph sz="half" idx="2"/>
+          </p:nvPr>
+        </p:nvPicPr>
+        <p:blipFill>
+          <a:blip r:embed="rId3">
+            <a:extLst>
+              <a:ext uri="{28A0092B-C50C-407E-A947-70E740481C1C}">
+                <a14:useLocalDpi xmlns:a14="http://schemas.microsoft.com/office/drawing/2010/main" val="0"/>
+              </a:ext>
+            </a:extLst>
+          </a:blip>
+          <a:srcRect/>
+          <a:stretch>
+            <a:fillRect/>
+          </a:stretch>
+        </p:blipFill>
+        <p:spPr bwMode="auto">
+          <a:xfrm>
+            <a:off x="2394857" y="2899954"/>
+            <a:ext cx="7236823" cy="2961096"/>
+          </a:xfrm>
+          <a:prstGeom prst="rect">
+            <a:avLst/>
+          </a:prstGeom>
+          <a:noFill/>
+          <a:extLst>
+            <a:ext uri="{909E8E84-426E-40DD-AFC4-6F175D3DCCD1}">
+              <a14:hiddenFill xmlns:a14="http://schemas.microsoft.com/office/drawing/2010/main">
                 <a:solidFill>
-                  <a:srgbClr val="0070C0"/>
+                  <a:srgbClr val="FFFFFF"/>
                 </a:solidFill>
-              </a:rPr>
-              <a:t>&gt;&gt;&gt;&gt;&gt;&gt; Code On the Screen &lt;&lt;&lt;&lt;&lt;&lt;</a:t>
-            </a:r>
-            <a:endParaRPr lang="en-US" dirty="0" smtClean="0"/>
-          </a:p>
-          <a:p>
-            <a:endParaRPr lang="en-US" dirty="0" smtClean="0"/>
-          </a:p>
-        </p:txBody>
-      </p:sp>
+              </a14:hiddenFill>
+            </a:ext>
+          </a:extLst>
+        </p:spPr>
+      </p:pic>
     </p:spTree>
     <p:extLst>
       <p:ext uri="{BB962C8B-B14F-4D97-AF65-F5344CB8AC3E}">
@@ -13748,20 +13840,6 @@
             <a:endParaRPr lang="en-US" dirty="0"/>
           </a:p>
           <a:p>
-            <a:pPr marL="324000" lvl="1" indent="0" algn="ctr">
-              <a:buNone/>
-            </a:pPr>
-            <a:r>
-              <a:rPr lang="en-US" b="1" dirty="0">
-                <a:solidFill>
-                  <a:srgbClr val="0070C0"/>
-                </a:solidFill>
-              </a:rPr>
-              <a:t>&gt;&gt;&gt;&gt;&gt;&gt; Code On the Screen &lt;&lt;&lt;&lt;&lt;&lt;</a:t>
-            </a:r>
-            <a:endParaRPr lang="en-US" dirty="0"/>
-          </a:p>
-          <a:p>
             <a:pPr marL="324000" lvl="1" indent="0">
               <a:buNone/>
             </a:pPr>
@@ -13773,6 +13851,49 @@
           </a:p>
         </p:txBody>
       </p:sp>
+      <p:pic>
+        <p:nvPicPr>
+          <p:cNvPr id="5" name="Picture 2" descr="https://memegenerator.net/img/instances/61907223/talk-is-cheap-show-me-the-code.jpg"/>
+          <p:cNvPicPr>
+            <a:picLocks noGrp="1" noChangeAspect="1" noChangeArrowheads="1"/>
+          </p:cNvPicPr>
+          <p:nvPr>
+            <p:ph sz="half" idx="2"/>
+          </p:nvPr>
+        </p:nvPicPr>
+        <p:blipFill>
+          <a:blip r:embed="rId3">
+            <a:extLst>
+              <a:ext uri="{28A0092B-C50C-407E-A947-70E740481C1C}">
+                <a14:useLocalDpi xmlns:a14="http://schemas.microsoft.com/office/drawing/2010/main" val="0"/>
+              </a:ext>
+            </a:extLst>
+          </a:blip>
+          <a:srcRect/>
+          <a:stretch>
+            <a:fillRect/>
+          </a:stretch>
+        </p:blipFill>
+        <p:spPr bwMode="auto">
+          <a:xfrm>
+            <a:off x="6148252" y="3492137"/>
+            <a:ext cx="5538651" cy="2799806"/>
+          </a:xfrm>
+          <a:prstGeom prst="rect">
+            <a:avLst/>
+          </a:prstGeom>
+          <a:noFill/>
+          <a:extLst>
+            <a:ext uri="{909E8E84-426E-40DD-AFC4-6F175D3DCCD1}">
+              <a14:hiddenFill xmlns:a14="http://schemas.microsoft.com/office/drawing/2010/main">
+                <a:solidFill>
+                  <a:srgbClr val="FFFFFF"/>
+                </a:solidFill>
+              </a14:hiddenFill>
+            </a:ext>
+          </a:extLst>
+        </p:spPr>
+      </p:pic>
     </p:spTree>
     <p:extLst>
       <p:ext uri="{BB962C8B-B14F-4D97-AF65-F5344CB8AC3E}">
@@ -13984,20 +14105,6 @@
             <a:endParaRPr lang="en-US" dirty="0"/>
           </a:p>
           <a:p>
-            <a:pPr marL="324000" lvl="1" indent="0" algn="ctr">
-              <a:buNone/>
-            </a:pPr>
-            <a:r>
-              <a:rPr lang="en-US" b="1" dirty="0">
-                <a:solidFill>
-                  <a:srgbClr val="0070C0"/>
-                </a:solidFill>
-              </a:rPr>
-              <a:t>&gt;&gt;&gt;&gt;&gt;&gt; Code On the Screen &lt;&lt;&lt;&lt;&lt;&lt;</a:t>
-            </a:r>
-            <a:endParaRPr lang="en-US" dirty="0"/>
-          </a:p>
-          <a:p>
             <a:pPr marL="324000" lvl="1" indent="0">
               <a:buNone/>
             </a:pPr>
@@ -14009,6 +14116,49 @@
           </a:p>
         </p:txBody>
       </p:sp>
+      <p:pic>
+        <p:nvPicPr>
+          <p:cNvPr id="5" name="Picture 2" descr="https://memegenerator.net/img/instances/61907223/talk-is-cheap-show-me-the-code.jpg"/>
+          <p:cNvPicPr>
+            <a:picLocks noGrp="1" noChangeAspect="1" noChangeArrowheads="1"/>
+          </p:cNvPicPr>
+          <p:nvPr>
+            <p:ph sz="half" idx="2"/>
+          </p:nvPr>
+        </p:nvPicPr>
+        <p:blipFill>
+          <a:blip r:embed="rId3">
+            <a:extLst>
+              <a:ext uri="{28A0092B-C50C-407E-A947-70E740481C1C}">
+                <a14:useLocalDpi xmlns:a14="http://schemas.microsoft.com/office/drawing/2010/main" val="0"/>
+              </a:ext>
+            </a:extLst>
+          </a:blip>
+          <a:srcRect/>
+          <a:stretch>
+            <a:fillRect/>
+          </a:stretch>
+        </p:blipFill>
+        <p:spPr bwMode="auto">
+          <a:xfrm>
+            <a:off x="2394857" y="2430463"/>
+            <a:ext cx="7236823" cy="3430587"/>
+          </a:xfrm>
+          <a:prstGeom prst="rect">
+            <a:avLst/>
+          </a:prstGeom>
+          <a:noFill/>
+          <a:extLst>
+            <a:ext uri="{909E8E84-426E-40DD-AFC4-6F175D3DCCD1}">
+              <a14:hiddenFill xmlns:a14="http://schemas.microsoft.com/office/drawing/2010/main">
+                <a:solidFill>
+                  <a:srgbClr val="FFFFFF"/>
+                </a:solidFill>
+              </a14:hiddenFill>
+            </a:ext>
+          </a:extLst>
+        </p:spPr>
+      </p:pic>
     </p:spTree>
     <p:extLst>
       <p:ext uri="{BB962C8B-B14F-4D97-AF65-F5344CB8AC3E}">
@@ -14112,20 +14262,6 @@
             <a:endParaRPr lang="en-US" dirty="0"/>
           </a:p>
           <a:p>
-            <a:pPr marL="324000" lvl="1" indent="0" algn="ctr">
-              <a:buNone/>
-            </a:pPr>
-            <a:r>
-              <a:rPr lang="en-US" b="1" dirty="0">
-                <a:solidFill>
-                  <a:srgbClr val="0070C0"/>
-                </a:solidFill>
-              </a:rPr>
-              <a:t>&gt;&gt;&gt;&gt;&gt;&gt; Code On the Screen &lt;&lt;&lt;&lt;&lt;&lt;</a:t>
-            </a:r>
-            <a:endParaRPr lang="en-US" dirty="0"/>
-          </a:p>
-          <a:p>
             <a:pPr marL="324000" lvl="1" indent="0">
               <a:buNone/>
             </a:pPr>
@@ -14137,10 +14273,126 @@
           </a:p>
         </p:txBody>
       </p:sp>
+      <p:pic>
+        <p:nvPicPr>
+          <p:cNvPr id="5" name="Picture 2" descr="https://memegenerator.net/img/instances/61907223/talk-is-cheap-show-me-the-code.jpg"/>
+          <p:cNvPicPr>
+            <a:picLocks noGrp="1" noChangeAspect="1" noChangeArrowheads="1"/>
+          </p:cNvPicPr>
+          <p:nvPr>
+            <p:ph sz="half" idx="2"/>
+          </p:nvPr>
+        </p:nvPicPr>
+        <p:blipFill>
+          <a:blip r:embed="rId3">
+            <a:extLst>
+              <a:ext uri="{28A0092B-C50C-407E-A947-70E740481C1C}">
+                <a14:useLocalDpi xmlns:a14="http://schemas.microsoft.com/office/drawing/2010/main" val="0"/>
+              </a:ext>
+            </a:extLst>
+          </a:blip>
+          <a:srcRect/>
+          <a:stretch>
+            <a:fillRect/>
+          </a:stretch>
+        </p:blipFill>
+        <p:spPr bwMode="auto">
+          <a:xfrm>
+            <a:off x="2394857" y="2430463"/>
+            <a:ext cx="7236823" cy="3430587"/>
+          </a:xfrm>
+          <a:prstGeom prst="rect">
+            <a:avLst/>
+          </a:prstGeom>
+          <a:noFill/>
+          <a:extLst>
+            <a:ext uri="{909E8E84-426E-40DD-AFC4-6F175D3DCCD1}">
+              <a14:hiddenFill xmlns:a14="http://schemas.microsoft.com/office/drawing/2010/main">
+                <a:solidFill>
+                  <a:srgbClr val="FFFFFF"/>
+                </a:solidFill>
+              </a14:hiddenFill>
+            </a:ext>
+          </a:extLst>
+        </p:spPr>
+      </p:pic>
     </p:spTree>
     <p:extLst>
       <p:ext uri="{BB962C8B-B14F-4D97-AF65-F5344CB8AC3E}">
         <p14:creationId xmlns:p14="http://schemas.microsoft.com/office/powerpoint/2010/main" val="4209415954"/>
+      </p:ext>
+    </p:extLst>
+  </p:cSld>
+  <p:clrMapOvr>
+    <a:masterClrMapping/>
+  </p:clrMapOvr>
+</p:sld>
+</file>
+
+<file path=ppt/slides/slide22.xml><?xml version="1.0" encoding="utf-8"?>
+<p:sld xmlns:a="http://schemas.openxmlformats.org/drawingml/2006/main" xmlns:r="http://schemas.openxmlformats.org/officeDocument/2006/relationships" xmlns:p="http://schemas.openxmlformats.org/presentationml/2006/main">
+  <p:cSld>
+    <p:spTree>
+      <p:nvGrpSpPr>
+        <p:cNvPr id="1" name=""/>
+        <p:cNvGrpSpPr/>
+        <p:nvPr/>
+      </p:nvGrpSpPr>
+      <p:grpSpPr>
+        <a:xfrm>
+          <a:off x="0" y="0"/>
+          <a:ext cx="0" cy="0"/>
+          <a:chOff x="0" y="0"/>
+          <a:chExt cx="0" cy="0"/>
+        </a:xfrm>
+      </p:grpSpPr>
+      <p:pic>
+        <p:nvPicPr>
+          <p:cNvPr id="5" name="Picture 12" descr="thanks for listening any questions? - MR bean | Meme Generator"/>
+          <p:cNvPicPr>
+            <a:picLocks noGrp="1" noChangeAspect="1" noChangeArrowheads="1"/>
+          </p:cNvPicPr>
+          <p:nvPr>
+            <p:ph sz="half" idx="1"/>
+          </p:nvPr>
+        </p:nvPicPr>
+        <p:blipFill>
+          <a:blip r:embed="rId2">
+            <a:extLst>
+              <a:ext uri="{28A0092B-C50C-407E-A947-70E740481C1C}">
+                <a14:useLocalDpi xmlns:a14="http://schemas.microsoft.com/office/drawing/2010/main" val="0"/>
+              </a:ext>
+            </a:extLst>
+          </a:blip>
+          <a:srcRect/>
+          <a:stretch>
+            <a:fillRect/>
+          </a:stretch>
+        </p:blipFill>
+        <p:spPr bwMode="auto">
+          <a:xfrm>
+            <a:off x="3091542" y="2279514"/>
+            <a:ext cx="5773783" cy="3633787"/>
+          </a:xfrm>
+          <a:prstGeom prst="rect">
+            <a:avLst/>
+          </a:prstGeom>
+          <a:noFill/>
+          <a:extLst>
+            <a:ext uri="{909E8E84-426E-40DD-AFC4-6F175D3DCCD1}">
+              <a14:hiddenFill xmlns:a14="http://schemas.microsoft.com/office/drawing/2010/main">
+                <a:solidFill>
+                  <a:srgbClr val="FFFFFF"/>
+                </a:solidFill>
+              </a14:hiddenFill>
+            </a:ext>
+          </a:extLst>
+        </p:spPr>
+      </p:pic>
+    </p:spTree>
+    <p:extLst>
+      <p:ext uri="{BB962C8B-B14F-4D97-AF65-F5344CB8AC3E}">
+        <p14:creationId xmlns:p14="http://schemas.microsoft.com/office/powerpoint/2010/main" val="1446462585"/>
       </p:ext>
     </p:extLst>
   </p:cSld>
@@ -14957,8 +15209,8 @@
         </p:nvSpPr>
         <p:spPr>
           <a:xfrm>
-            <a:off x="478972" y="2429691"/>
-            <a:ext cx="11131838" cy="3431359"/>
+            <a:off x="496389" y="2055221"/>
+            <a:ext cx="11131838" cy="2333355"/>
           </a:xfrm>
         </p:spPr>
         <p:txBody>
@@ -15022,43 +15274,54 @@
             </a:endParaRPr>
           </a:p>
           <a:p>
-            <a:pPr marL="0" indent="0" algn="ctr">
+            <a:pPr marL="0" indent="0">
               <a:buNone/>
             </a:pPr>
-            <a:r>
-              <a:rPr lang="en-US" b="1" dirty="0" smtClean="0">
+            <a:endParaRPr lang="en-US" dirty="0"/>
+          </a:p>
+        </p:txBody>
+      </p:sp>
+      <p:pic>
+        <p:nvPicPr>
+          <p:cNvPr id="1026" name="Picture 2" descr="https://memegenerator.net/img/instances/61907223/talk-is-cheap-show-me-the-code.jpg"/>
+          <p:cNvPicPr>
+            <a:picLocks noChangeAspect="1" noChangeArrowheads="1"/>
+          </p:cNvPicPr>
+          <p:nvPr/>
+        </p:nvPicPr>
+        <p:blipFill>
+          <a:blip r:embed="rId3">
+            <a:extLst>
+              <a:ext uri="{28A0092B-C50C-407E-A947-70E740481C1C}">
+                <a14:useLocalDpi xmlns:a14="http://schemas.microsoft.com/office/drawing/2010/main" val="0"/>
+              </a:ext>
+            </a:extLst>
+          </a:blip>
+          <a:srcRect/>
+          <a:stretch>
+            <a:fillRect/>
+          </a:stretch>
+        </p:blipFill>
+        <p:spPr bwMode="auto">
+          <a:xfrm>
+            <a:off x="1897289" y="3536449"/>
+            <a:ext cx="7239000" cy="2881768"/>
+          </a:xfrm>
+          <a:prstGeom prst="rect">
+            <a:avLst/>
+          </a:prstGeom>
+          <a:noFill/>
+          <a:extLst>
+            <a:ext uri="{909E8E84-426E-40DD-AFC4-6F175D3DCCD1}">
+              <a14:hiddenFill xmlns:a14="http://schemas.microsoft.com/office/drawing/2010/main">
                 <a:solidFill>
-                  <a:srgbClr val="0070C0"/>
+                  <a:srgbClr val="FFFFFF"/>
                 </a:solidFill>
-              </a:rPr>
-              <a:t>&gt;&gt;&gt;&gt;&gt;&gt; Code On the Screen &lt;&lt;&lt;&lt;&lt;&lt;</a:t>
-            </a:r>
-            <a:r>
-              <a:rPr lang="en-US" b="1" dirty="0">
-                <a:solidFill>
-                  <a:srgbClr val="0070C0"/>
-                </a:solidFill>
-              </a:rPr>
-              <a:t/>
-            </a:r>
-            <a:br>
-              <a:rPr lang="en-US" b="1" dirty="0">
-                <a:solidFill>
-                  <a:srgbClr val="0070C0"/>
-                </a:solidFill>
-              </a:rPr>
-            </a:br>
-            <a:endParaRPr lang="en-US" b="1" dirty="0" smtClean="0">
-              <a:solidFill>
-                <a:srgbClr val="0070C0"/>
-              </a:solidFill>
-            </a:endParaRPr>
-          </a:p>
-          <a:p>
-            <a:endParaRPr lang="en-US" dirty="0"/>
-          </a:p>
-        </p:txBody>
-      </p:sp>
+              </a14:hiddenFill>
+            </a:ext>
+          </a:extLst>
+        </p:spPr>
+      </p:pic>
     </p:spTree>
     <p:extLst>
       <p:ext uri="{BB962C8B-B14F-4D97-AF65-F5344CB8AC3E}">
@@ -15127,65 +15390,49 @@
           </a:p>
         </p:txBody>
       </p:sp>
-      <p:sp>
-        <p:nvSpPr>
-          <p:cNvPr id="4" name="Content Placeholder 3"/>
-          <p:cNvSpPr>
-            <a:spLocks noGrp="1"/>
-          </p:cNvSpPr>
+      <p:pic>
+        <p:nvPicPr>
+          <p:cNvPr id="2050" name="Picture 2" descr="https://memegenerator.net/img/instances/52770151/talk-is-cheap-show-me-the-code.jpg"/>
+          <p:cNvPicPr>
+            <a:picLocks noGrp="1" noChangeAspect="1" noChangeArrowheads="1"/>
+          </p:cNvPicPr>
           <p:nvPr>
             <p:ph sz="half" idx="2"/>
           </p:nvPr>
-        </p:nvSpPr>
-        <p:spPr>
+        </p:nvPicPr>
+        <p:blipFill>
+          <a:blip r:embed="rId3">
+            <a:extLst>
+              <a:ext uri="{28A0092B-C50C-407E-A947-70E740481C1C}">
+                <a14:useLocalDpi xmlns:a14="http://schemas.microsoft.com/office/drawing/2010/main" val="0"/>
+              </a:ext>
+            </a:extLst>
+          </a:blip>
+          <a:srcRect/>
+          <a:stretch>
+            <a:fillRect/>
+          </a:stretch>
+        </p:blipFill>
+        <p:spPr bwMode="auto">
           <a:xfrm>
-            <a:off x="478972" y="2429691"/>
-            <a:ext cx="11131838" cy="3431359"/>
+            <a:off x="3048000" y="2430463"/>
+            <a:ext cx="5860869" cy="3796166"/>
           </a:xfrm>
+          <a:prstGeom prst="rect">
+            <a:avLst/>
+          </a:prstGeom>
+          <a:noFill/>
+          <a:extLst>
+            <a:ext uri="{909E8E84-426E-40DD-AFC4-6F175D3DCCD1}">
+              <a14:hiddenFill xmlns:a14="http://schemas.microsoft.com/office/drawing/2010/main">
+                <a:solidFill>
+                  <a:srgbClr val="FFFFFF"/>
+                </a:solidFill>
+              </a14:hiddenFill>
+            </a:ext>
+          </a:extLst>
         </p:spPr>
-        <p:txBody>
-          <a:bodyPr>
-            <a:normAutofit/>
-          </a:bodyPr>
-          <a:lstStyle/>
-          <a:p>
-            <a:pPr marL="0" indent="0" algn="ctr">
-              <a:buNone/>
-            </a:pPr>
-            <a:r>
-              <a:rPr lang="en-US" b="1" dirty="0" smtClean="0">
-                <a:solidFill>
-                  <a:srgbClr val="0070C0"/>
-                </a:solidFill>
-              </a:rPr>
-              <a:t>&gt;&gt;&gt;&gt;&gt;&gt; Code On the Screen &lt;&lt;&lt;&lt;&lt;&lt;</a:t>
-            </a:r>
-            <a:r>
-              <a:rPr lang="en-US" b="1" dirty="0">
-                <a:solidFill>
-                  <a:srgbClr val="0070C0"/>
-                </a:solidFill>
-              </a:rPr>
-              <a:t/>
-            </a:r>
-            <a:br>
-              <a:rPr lang="en-US" b="1" dirty="0">
-                <a:solidFill>
-                  <a:srgbClr val="0070C0"/>
-                </a:solidFill>
-              </a:rPr>
-            </a:br>
-            <a:endParaRPr lang="en-US" b="1" dirty="0" smtClean="0">
-              <a:solidFill>
-                <a:srgbClr val="0070C0"/>
-              </a:solidFill>
-            </a:endParaRPr>
-          </a:p>
-          <a:p>
-            <a:endParaRPr lang="en-US" dirty="0"/>
-          </a:p>
-        </p:txBody>
-      </p:sp>
+      </p:pic>
     </p:spTree>
     <p:extLst>
       <p:ext uri="{BB962C8B-B14F-4D97-AF65-F5344CB8AC3E}">
@@ -15254,65 +15501,49 @@
           </a:p>
         </p:txBody>
       </p:sp>
-      <p:sp>
-        <p:nvSpPr>
-          <p:cNvPr id="4" name="Content Placeholder 3"/>
-          <p:cNvSpPr>
-            <a:spLocks noGrp="1"/>
-          </p:cNvSpPr>
+      <p:pic>
+        <p:nvPicPr>
+          <p:cNvPr id="5" name="Picture 2" descr="https://memegenerator.net/img/instances/61907223/talk-is-cheap-show-me-the-code.jpg"/>
+          <p:cNvPicPr>
+            <a:picLocks noGrp="1" noChangeAspect="1" noChangeArrowheads="1"/>
+          </p:cNvPicPr>
           <p:nvPr>
             <p:ph sz="half" idx="2"/>
           </p:nvPr>
-        </p:nvSpPr>
-        <p:spPr>
+        </p:nvPicPr>
+        <p:blipFill>
+          <a:blip r:embed="rId3">
+            <a:extLst>
+              <a:ext uri="{28A0092B-C50C-407E-A947-70E740481C1C}">
+                <a14:useLocalDpi xmlns:a14="http://schemas.microsoft.com/office/drawing/2010/main" val="0"/>
+              </a:ext>
+            </a:extLst>
+          </a:blip>
+          <a:srcRect/>
+          <a:stretch>
+            <a:fillRect/>
+          </a:stretch>
+        </p:blipFill>
+        <p:spPr bwMode="auto">
           <a:xfrm>
-            <a:off x="478972" y="2429691"/>
-            <a:ext cx="11131838" cy="3431359"/>
+            <a:off x="2621281" y="2430463"/>
+            <a:ext cx="6757850" cy="3430587"/>
           </a:xfrm>
+          <a:prstGeom prst="rect">
+            <a:avLst/>
+          </a:prstGeom>
+          <a:noFill/>
+          <a:extLst>
+            <a:ext uri="{909E8E84-426E-40DD-AFC4-6F175D3DCCD1}">
+              <a14:hiddenFill xmlns:a14="http://schemas.microsoft.com/office/drawing/2010/main">
+                <a:solidFill>
+                  <a:srgbClr val="FFFFFF"/>
+                </a:solidFill>
+              </a14:hiddenFill>
+            </a:ext>
+          </a:extLst>
         </p:spPr>
-        <p:txBody>
-          <a:bodyPr>
-            <a:normAutofit/>
-          </a:bodyPr>
-          <a:lstStyle/>
-          <a:p>
-            <a:pPr marL="0" indent="0" algn="ctr">
-              <a:buNone/>
-            </a:pPr>
-            <a:r>
-              <a:rPr lang="en-US" b="1" dirty="0" smtClean="0">
-                <a:solidFill>
-                  <a:srgbClr val="0070C0"/>
-                </a:solidFill>
-              </a:rPr>
-              <a:t>&gt;&gt;&gt;&gt;&gt;&gt; Code On the Screen &lt;&lt;&lt;&lt;&lt;&lt;</a:t>
-            </a:r>
-            <a:r>
-              <a:rPr lang="en-US" b="1" dirty="0">
-                <a:solidFill>
-                  <a:srgbClr val="0070C0"/>
-                </a:solidFill>
-              </a:rPr>
-              <a:t/>
-            </a:r>
-            <a:br>
-              <a:rPr lang="en-US" b="1" dirty="0">
-                <a:solidFill>
-                  <a:srgbClr val="0070C0"/>
-                </a:solidFill>
-              </a:rPr>
-            </a:br>
-            <a:endParaRPr lang="en-US" b="1" dirty="0" smtClean="0">
-              <a:solidFill>
-                <a:srgbClr val="0070C0"/>
-              </a:solidFill>
-            </a:endParaRPr>
-          </a:p>
-          <a:p>
-            <a:endParaRPr lang="en-US" dirty="0"/>
-          </a:p>
-        </p:txBody>
-      </p:sp>
+      </p:pic>
     </p:spTree>
     <p:extLst>
       <p:ext uri="{BB962C8B-B14F-4D97-AF65-F5344CB8AC3E}">
@@ -15381,65 +15612,49 @@
           </a:p>
         </p:txBody>
       </p:sp>
-      <p:sp>
-        <p:nvSpPr>
-          <p:cNvPr id="4" name="Content Placeholder 3"/>
-          <p:cNvSpPr>
-            <a:spLocks noGrp="1"/>
-          </p:cNvSpPr>
+      <p:pic>
+        <p:nvPicPr>
+          <p:cNvPr id="5" name="Picture 2" descr="https://memegenerator.net/img/instances/61907223/talk-is-cheap-show-me-the-code.jpg"/>
+          <p:cNvPicPr>
+            <a:picLocks noGrp="1" noChangeAspect="1" noChangeArrowheads="1"/>
+          </p:cNvPicPr>
           <p:nvPr>
             <p:ph sz="half" idx="2"/>
           </p:nvPr>
-        </p:nvSpPr>
-        <p:spPr>
+        </p:nvPicPr>
+        <p:blipFill>
+          <a:blip r:embed="rId3">
+            <a:extLst>
+              <a:ext uri="{28A0092B-C50C-407E-A947-70E740481C1C}">
+                <a14:useLocalDpi xmlns:a14="http://schemas.microsoft.com/office/drawing/2010/main" val="0"/>
+              </a:ext>
+            </a:extLst>
+          </a:blip>
+          <a:srcRect/>
+          <a:stretch>
+            <a:fillRect/>
+          </a:stretch>
+        </p:blipFill>
+        <p:spPr bwMode="auto">
           <a:xfrm>
-            <a:off x="478972" y="2429691"/>
-            <a:ext cx="11131838" cy="3431359"/>
+            <a:off x="2394857" y="2430463"/>
+            <a:ext cx="7236823" cy="3430587"/>
           </a:xfrm>
+          <a:prstGeom prst="rect">
+            <a:avLst/>
+          </a:prstGeom>
+          <a:noFill/>
+          <a:extLst>
+            <a:ext uri="{909E8E84-426E-40DD-AFC4-6F175D3DCCD1}">
+              <a14:hiddenFill xmlns:a14="http://schemas.microsoft.com/office/drawing/2010/main">
+                <a:solidFill>
+                  <a:srgbClr val="FFFFFF"/>
+                </a:solidFill>
+              </a14:hiddenFill>
+            </a:ext>
+          </a:extLst>
         </p:spPr>
-        <p:txBody>
-          <a:bodyPr>
-            <a:normAutofit/>
-          </a:bodyPr>
-          <a:lstStyle/>
-          <a:p>
-            <a:pPr marL="0" indent="0" algn="ctr">
-              <a:buNone/>
-            </a:pPr>
-            <a:r>
-              <a:rPr lang="en-US" b="1" dirty="0" smtClean="0">
-                <a:solidFill>
-                  <a:srgbClr val="0070C0"/>
-                </a:solidFill>
-              </a:rPr>
-              <a:t>&gt;&gt;&gt;&gt;&gt;&gt; Code On the Screen &lt;&lt;&lt;&lt;&lt;&lt;</a:t>
-            </a:r>
-            <a:r>
-              <a:rPr lang="en-US" b="1" dirty="0">
-                <a:solidFill>
-                  <a:srgbClr val="0070C0"/>
-                </a:solidFill>
-              </a:rPr>
-              <a:t/>
-            </a:r>
-            <a:br>
-              <a:rPr lang="en-US" b="1" dirty="0">
-                <a:solidFill>
-                  <a:srgbClr val="0070C0"/>
-                </a:solidFill>
-              </a:rPr>
-            </a:br>
-            <a:endParaRPr lang="en-US" b="1" dirty="0" smtClean="0">
-              <a:solidFill>
-                <a:srgbClr val="0070C0"/>
-              </a:solidFill>
-            </a:endParaRPr>
-          </a:p>
-          <a:p>
-            <a:endParaRPr lang="en-US" dirty="0"/>
-          </a:p>
-        </p:txBody>
-      </p:sp>
+      </p:pic>
     </p:spTree>
     <p:extLst>
       <p:ext uri="{BB962C8B-B14F-4D97-AF65-F5344CB8AC3E}">
@@ -16313,21 +16528,21 @@
 </file>
 
 <file path=customXml/item1.xml><?xml version="1.0" encoding="utf-8"?>
+<?mso-contentType ?>
+<FormTemplates xmlns="http://schemas.microsoft.com/sharepoint/v3/contenttype/forms">
+  <Display>DocumentLibraryForm</Display>
+  <Edit>DocumentLibraryForm</Edit>
+  <New>DocumentLibraryForm</New>
+</FormTemplates>
+</file>
+
+<file path=customXml/item2.xml><?xml version="1.0" encoding="utf-8"?>
 <p:properties xmlns:p="http://schemas.microsoft.com/office/2006/metadata/properties" xmlns:xsi="http://www.w3.org/2001/XMLSchema-instance" xmlns:pc="http://schemas.microsoft.com/office/infopath/2007/PartnerControls">
   <documentManagement>
     <MediaServiceKeyPoints xmlns="71af3243-3dd4-4a8d-8c0d-dd76da1f02a5" xsi:nil="true"/>
     <Status xmlns="71af3243-3dd4-4a8d-8c0d-dd76da1f02a5">Not started</Status>
   </documentManagement>
 </p:properties>
-</file>
-
-<file path=customXml/item2.xml><?xml version="1.0" encoding="utf-8"?>
-<?mso-contentType ?>
-<FormTemplates xmlns="http://schemas.microsoft.com/sharepoint/v3/contenttype/forms">
-  <Display>DocumentLibraryForm</Display>
-  <Edit>DocumentLibraryForm</Edit>
-  <New>DocumentLibraryForm</New>
-</FormTemplates>
 </file>
 
 <file path=customXml/item3.xml><?xml version="1.0" encoding="utf-8"?>
@@ -16552,19 +16767,19 @@
 </file>
 
 <file path=customXml/itemProps1.xml><?xml version="1.0" encoding="utf-8"?>
+<ds:datastoreItem xmlns:ds="http://schemas.openxmlformats.org/officeDocument/2006/customXml" ds:itemID="{E3FC8A1C-A436-42C0-AC33-FAFFFAF219BC}">
+  <ds:schemaRefs>
+    <ds:schemaRef ds:uri="http://schemas.microsoft.com/sharepoint/v3/contenttype/forms"/>
+  </ds:schemaRefs>
+</ds:datastoreItem>
+</file>
+
+<file path=customXml/itemProps2.xml><?xml version="1.0" encoding="utf-8"?>
 <ds:datastoreItem xmlns:ds="http://schemas.openxmlformats.org/officeDocument/2006/customXml" ds:itemID="{FF5C8BF1-B0E4-49A1-808F-40F2AD30E743}">
   <ds:schemaRefs>
     <ds:schemaRef ds:uri="http://schemas.microsoft.com/office/2006/metadata/properties"/>
     <ds:schemaRef ds:uri="http://schemas.microsoft.com/office/infopath/2007/PartnerControls"/>
     <ds:schemaRef ds:uri="71af3243-3dd4-4a8d-8c0d-dd76da1f02a5"/>
-  </ds:schemaRefs>
-</ds:datastoreItem>
-</file>
-
-<file path=customXml/itemProps2.xml><?xml version="1.0" encoding="utf-8"?>
-<ds:datastoreItem xmlns:ds="http://schemas.openxmlformats.org/officeDocument/2006/customXml" ds:itemID="{E3FC8A1C-A436-42C0-AC33-FAFFFAF219BC}">
-  <ds:schemaRefs>
-    <ds:schemaRef ds:uri="http://schemas.microsoft.com/sharepoint/v3/contenttype/forms"/>
   </ds:schemaRefs>
 </ds:datastoreItem>
 </file>

</xml_diff>